<commit_message>
Add design ideas for new icons
</commit_message>
<xml_diff>
--- a/doc/Icons-Help.pptx
+++ b/doc/Icons-Help.pptx
@@ -14,19 +14,19 @@
   <p:notesSz cx="6858000" cy="9144000"/>
   <p:embeddedFontLst>
     <p:embeddedFont>
-      <p:font typeface="Arial Black" panose="020B0A04020102020204" pitchFamily="34" charset="0"/>
+      <p:font typeface="Rockwell Extra Bold" panose="02060903040505020403" pitchFamily="18" charset="0"/>
       <p:bold r:id="rId4"/>
     </p:embeddedFont>
     <p:embeddedFont>
-      <p:font typeface="Calibri" panose="020F0502020204030204" pitchFamily="34" charset="0"/>
-      <p:regular r:id="rId5"/>
-      <p:bold r:id="rId6"/>
-      <p:italic r:id="rId7"/>
-      <p:boldItalic r:id="rId8"/>
+      <p:font typeface="Arial Black" panose="020B0A04020102020204" pitchFamily="34" charset="0"/>
+      <p:bold r:id="rId5"/>
     </p:embeddedFont>
     <p:embeddedFont>
-      <p:font typeface="Rockwell Extra Bold" panose="02060903040505020403" pitchFamily="18" charset="0"/>
-      <p:bold r:id="rId9"/>
+      <p:font typeface="Calibri" panose="020F0502020204030204" pitchFamily="34" charset="0"/>
+      <p:regular r:id="rId6"/>
+      <p:bold r:id="rId7"/>
+      <p:italic r:id="rId8"/>
+      <p:boldItalic r:id="rId9"/>
     </p:embeddedFont>
   </p:embeddedFontLst>
   <p:defaultTextStyle>
@@ -229,7 +229,7 @@
           <a:p>
             <a:fld id="{6699ACB9-486C-4D62-A3A7-AF98E13EFDA3}" type="datetimeFigureOut">
               <a:rPr lang="en-US" smtClean="0"/>
-              <a:t>6/7/2017</a:t>
+              <a:t>6/8/2017</a:t>
             </a:fld>
             <a:endParaRPr lang="en-US"/>
           </a:p>
@@ -760,7 +760,7 @@
             <a:fld id="{1D8BD707-D9CF-40AE-B4C6-C98DA3205C09}" type="datetimeFigureOut">
               <a:rPr lang="en-US" smtClean="0"/>
               <a:pPr/>
-              <a:t>6/7/2017</a:t>
+              <a:t>6/8/2017</a:t>
             </a:fld>
             <a:endParaRPr lang="en-US"/>
           </a:p>
@@ -925,7 +925,7 @@
             <a:fld id="{1D8BD707-D9CF-40AE-B4C6-C98DA3205C09}" type="datetimeFigureOut">
               <a:rPr lang="en-US" smtClean="0"/>
               <a:pPr/>
-              <a:t>6/7/2017</a:t>
+              <a:t>6/8/2017</a:t>
             </a:fld>
             <a:endParaRPr lang="en-US"/>
           </a:p>
@@ -1100,7 +1100,7 @@
             <a:fld id="{1D8BD707-D9CF-40AE-B4C6-C98DA3205C09}" type="datetimeFigureOut">
               <a:rPr lang="en-US" smtClean="0"/>
               <a:pPr/>
-              <a:t>6/7/2017</a:t>
+              <a:t>6/8/2017</a:t>
             </a:fld>
             <a:endParaRPr lang="en-US"/>
           </a:p>
@@ -1265,7 +1265,7 @@
             <a:fld id="{1D8BD707-D9CF-40AE-B4C6-C98DA3205C09}" type="datetimeFigureOut">
               <a:rPr lang="en-US" smtClean="0"/>
               <a:pPr/>
-              <a:t>6/7/2017</a:t>
+              <a:t>6/8/2017</a:t>
             </a:fld>
             <a:endParaRPr lang="en-US"/>
           </a:p>
@@ -1507,7 +1507,7 @@
             <a:fld id="{1D8BD707-D9CF-40AE-B4C6-C98DA3205C09}" type="datetimeFigureOut">
               <a:rPr lang="en-US" smtClean="0"/>
               <a:pPr/>
-              <a:t>6/7/2017</a:t>
+              <a:t>6/8/2017</a:t>
             </a:fld>
             <a:endParaRPr lang="en-US"/>
           </a:p>
@@ -1789,7 +1789,7 @@
             <a:fld id="{1D8BD707-D9CF-40AE-B4C6-C98DA3205C09}" type="datetimeFigureOut">
               <a:rPr lang="en-US" smtClean="0"/>
               <a:pPr/>
-              <a:t>6/7/2017</a:t>
+              <a:t>6/8/2017</a:t>
             </a:fld>
             <a:endParaRPr lang="en-US"/>
           </a:p>
@@ -2205,7 +2205,7 @@
             <a:fld id="{1D8BD707-D9CF-40AE-B4C6-C98DA3205C09}" type="datetimeFigureOut">
               <a:rPr lang="en-US" smtClean="0"/>
               <a:pPr/>
-              <a:t>6/7/2017</a:t>
+              <a:t>6/8/2017</a:t>
             </a:fld>
             <a:endParaRPr lang="en-US"/>
           </a:p>
@@ -2319,7 +2319,7 @@
             <a:fld id="{1D8BD707-D9CF-40AE-B4C6-C98DA3205C09}" type="datetimeFigureOut">
               <a:rPr lang="en-US" smtClean="0"/>
               <a:pPr/>
-              <a:t>6/7/2017</a:t>
+              <a:t>6/8/2017</a:t>
             </a:fld>
             <a:endParaRPr lang="en-US"/>
           </a:p>
@@ -2411,7 +2411,7 @@
             <a:fld id="{1D8BD707-D9CF-40AE-B4C6-C98DA3205C09}" type="datetimeFigureOut">
               <a:rPr lang="en-US" smtClean="0"/>
               <a:pPr/>
-              <a:t>6/7/2017</a:t>
+              <a:t>6/8/2017</a:t>
             </a:fld>
             <a:endParaRPr lang="en-US"/>
           </a:p>
@@ -2683,7 +2683,7 @@
             <a:fld id="{1D8BD707-D9CF-40AE-B4C6-C98DA3205C09}" type="datetimeFigureOut">
               <a:rPr lang="en-US" smtClean="0"/>
               <a:pPr/>
-              <a:t>6/7/2017</a:t>
+              <a:t>6/8/2017</a:t>
             </a:fld>
             <a:endParaRPr lang="en-US"/>
           </a:p>
@@ -2932,7 +2932,7 @@
             <a:fld id="{1D8BD707-D9CF-40AE-B4C6-C98DA3205C09}" type="datetimeFigureOut">
               <a:rPr lang="en-US" smtClean="0"/>
               <a:pPr/>
-              <a:t>6/7/2017</a:t>
+              <a:t>6/8/2017</a:t>
             </a:fld>
             <a:endParaRPr lang="en-US"/>
           </a:p>
@@ -3140,7 +3140,7 @@
             <a:fld id="{1D8BD707-D9CF-40AE-B4C6-C98DA3205C09}" type="datetimeFigureOut">
               <a:rPr lang="en-US" smtClean="0"/>
               <a:pPr/>
-              <a:t>6/7/2017</a:t>
+              <a:t>6/8/2017</a:t>
             </a:fld>
             <a:endParaRPr lang="en-US"/>
           </a:p>
@@ -4619,7 +4619,7 @@
                   <a:solidFill>
                     <a:srgbClr val="0070C0"/>
                   </a:solidFill>
-                  <a:latin typeface="Rockwell Extra Bold" pitchFamily="18" charset="0"/>
+                  <a:latin typeface="Rockwell Extra Bold" panose="02060903040505020403" pitchFamily="18" charset="0"/>
                 </a:rPr>
                 <a:t>i</a:t>
               </a:r>
@@ -4632,7 +4632,7 @@
                 <a:solidFill>
                   <a:srgbClr val="0070C0"/>
                 </a:solidFill>
-                <a:latin typeface="Rockwell Extra Bold" pitchFamily="18" charset="0"/>
+                <a:latin typeface="Rockwell Extra Bold" panose="02060903040505020403" pitchFamily="18" charset="0"/>
               </a:endParaRPr>
             </a:p>
           </p:txBody>
@@ -5353,7 +5353,7 @@
         </p:nvSpPr>
         <p:spPr>
           <a:xfrm>
-            <a:off x="276082" y="3833864"/>
+            <a:off x="1046358" y="3926810"/>
             <a:ext cx="689438" cy="215444"/>
           </a:xfrm>
           <a:prstGeom prst="rect">
@@ -5383,8 +5383,8 @@
         </p:nvSpPr>
         <p:spPr>
           <a:xfrm flipH="1" flipV="1">
-            <a:off x="2250401" y="3283076"/>
-            <a:ext cx="497912" cy="550788"/>
+            <a:off x="2355464" y="3587831"/>
+            <a:ext cx="220116" cy="243491"/>
           </a:xfrm>
           <a:prstGeom prst="verticalScroll">
             <a:avLst/>
@@ -5392,7 +5392,7 @@
           <a:solidFill>
             <a:srgbClr val="F79646"/>
           </a:solidFill>
-          <a:ln>
+          <a:ln w="12700">
             <a:solidFill>
               <a:srgbClr val="0070C0"/>
             </a:solidFill>
@@ -5425,52 +5425,6 @@
       </p:sp>
       <p:sp>
         <p:nvSpPr>
-          <p:cNvPr id="8" name="Scroll: Horizontal 7"/>
-          <p:cNvSpPr/>
-          <p:nvPr/>
-        </p:nvSpPr>
-        <p:spPr>
-          <a:xfrm>
-            <a:off x="1054298" y="2551087"/>
-            <a:ext cx="558746" cy="505106"/>
-          </a:xfrm>
-          <a:prstGeom prst="horizontalScroll">
-            <a:avLst/>
-          </a:prstGeom>
-          <a:noFill/>
-          <a:ln>
-            <a:solidFill>
-              <a:srgbClr val="0070C0"/>
-            </a:solidFill>
-          </a:ln>
-        </p:spPr>
-        <p:style>
-          <a:lnRef idx="2">
-            <a:schemeClr val="accent1">
-              <a:shade val="50000"/>
-            </a:schemeClr>
-          </a:lnRef>
-          <a:fillRef idx="1">
-            <a:schemeClr val="accent1"/>
-          </a:fillRef>
-          <a:effectRef idx="0">
-            <a:schemeClr val="accent1"/>
-          </a:effectRef>
-          <a:fontRef idx="minor">
-            <a:schemeClr val="lt1"/>
-          </a:fontRef>
-        </p:style>
-        <p:txBody>
-          <a:bodyPr rtlCol="0" anchor="ctr"/>
-          <a:lstStyle/>
-          <a:p>
-            <a:pPr algn="ctr"/>
-            <a:endParaRPr lang="en-US"/>
-          </a:p>
-        </p:txBody>
-      </p:sp>
-      <p:sp>
-        <p:nvSpPr>
           <p:cNvPr id="13" name="TextBox 12"/>
           <p:cNvSpPr txBox="1"/>
           <p:nvPr/>
@@ -5535,7 +5489,7 @@
         </p:nvSpPr>
         <p:spPr>
           <a:xfrm>
-            <a:off x="3479268" y="3833864"/>
+            <a:off x="3958760" y="3765050"/>
             <a:ext cx="1262448" cy="215444"/>
           </a:xfrm>
           <a:prstGeom prst="rect">
@@ -5564,8 +5518,8 @@
         </p:nvSpPr>
         <p:spPr>
           <a:xfrm>
-            <a:off x="333481" y="5401055"/>
-            <a:ext cx="1262448" cy="215444"/>
+            <a:off x="6165009" y="3889043"/>
+            <a:ext cx="463276" cy="215444"/>
           </a:xfrm>
           <a:prstGeom prst="rect">
             <a:avLst/>
@@ -5581,113 +5535,6 @@
             <a:r>
               <a:rPr lang="en-US" sz="800" dirty="0"/>
               <a:t>About</a:t>
-            </a:r>
-          </a:p>
-        </p:txBody>
-      </p:sp>
-      <p:sp>
-        <p:nvSpPr>
-          <p:cNvPr id="149" name="TextBox 148"/>
-          <p:cNvSpPr txBox="1"/>
-          <p:nvPr/>
-        </p:nvSpPr>
-        <p:spPr>
-          <a:xfrm>
-            <a:off x="382376" y="4751219"/>
-            <a:ext cx="335348" cy="830997"/>
-          </a:xfrm>
-          <a:prstGeom prst="rect">
-            <a:avLst/>
-          </a:prstGeom>
-          <a:noFill/>
-        </p:spPr>
-        <p:txBody>
-          <a:bodyPr wrap="none" rtlCol="0">
-            <a:spAutoFit/>
-          </a:bodyPr>
-          <a:lstStyle/>
-          <a:p>
-            <a:r>
-              <a:rPr lang="en-US" sz="4800" b="1" dirty="0">
-                <a:solidFill>
-                  <a:srgbClr val="0070C0"/>
-                </a:solidFill>
-              </a:rPr>
-              <a:t>i</a:t>
-            </a:r>
-          </a:p>
-        </p:txBody>
-      </p:sp>
-      <p:sp>
-        <p:nvSpPr>
-          <p:cNvPr id="154" name="TextBox 153"/>
-          <p:cNvSpPr txBox="1"/>
-          <p:nvPr/>
-        </p:nvSpPr>
-        <p:spPr>
-          <a:xfrm>
-            <a:off x="762208" y="4758394"/>
-            <a:ext cx="335348" cy="830997"/>
-          </a:xfrm>
-          <a:prstGeom prst="rect">
-            <a:avLst/>
-          </a:prstGeom>
-          <a:noFill/>
-          <a:scene3d>
-            <a:camera prst="perspectiveRelaxedModerately"/>
-            <a:lightRig rig="threePt" dir="t"/>
-          </a:scene3d>
-        </p:spPr>
-        <p:txBody>
-          <a:bodyPr wrap="none" rtlCol="0">
-            <a:spAutoFit/>
-          </a:bodyPr>
-          <a:lstStyle/>
-          <a:p>
-            <a:r>
-              <a:rPr lang="en-US" sz="4800" b="1" dirty="0">
-                <a:solidFill>
-                  <a:srgbClr val="0070C0"/>
-                </a:solidFill>
-              </a:rPr>
-              <a:t>i</a:t>
-            </a:r>
-          </a:p>
-        </p:txBody>
-      </p:sp>
-      <p:sp>
-        <p:nvSpPr>
-          <p:cNvPr id="155" name="TextBox 154"/>
-          <p:cNvSpPr txBox="1"/>
-          <p:nvPr/>
-        </p:nvSpPr>
-        <p:spPr>
-          <a:xfrm>
-            <a:off x="1136789" y="4758394"/>
-            <a:ext cx="335348" cy="830997"/>
-          </a:xfrm>
-          <a:prstGeom prst="rect">
-            <a:avLst/>
-          </a:prstGeom>
-          <a:noFill/>
-          <a:scene3d>
-            <a:camera prst="perspectiveRelaxed"/>
-            <a:lightRig rig="threePt" dir="t"/>
-          </a:scene3d>
-        </p:spPr>
-        <p:txBody>
-          <a:bodyPr wrap="none" rtlCol="0">
-            <a:spAutoFit/>
-          </a:bodyPr>
-          <a:lstStyle/>
-          <a:p>
-            <a:r>
-              <a:rPr lang="en-US" sz="4800" b="1" dirty="0">
-                <a:solidFill>
-                  <a:srgbClr val="0070C0"/>
-                </a:solidFill>
-              </a:rPr>
-              <a:t>i</a:t>
             </a:r>
           </a:p>
         </p:txBody>
@@ -5702,13 +5549,13 @@
         </p:nvGrpSpPr>
         <p:grpSpPr>
           <a:xfrm>
-            <a:off x="3747992" y="3288610"/>
-            <a:ext cx="692727" cy="482996"/>
+            <a:off x="4411871" y="3541630"/>
+            <a:ext cx="277138" cy="193231"/>
             <a:chOff x="7300914" y="2545581"/>
             <a:chExt cx="685800" cy="399170"/>
           </a:xfrm>
           <a:solidFill>
-            <a:srgbClr val="0070C0"/>
+            <a:srgbClr val="F8A15A"/>
           </a:solidFill>
         </p:grpSpPr>
         <p:sp>
@@ -5726,8 +5573,10 @@
               <a:avLst/>
             </a:prstGeom>
             <a:grpFill/>
-            <a:ln>
-              <a:noFill/>
+            <a:ln w="12700">
+              <a:solidFill>
+                <a:srgbClr val="0070C0"/>
+              </a:solidFill>
             </a:ln>
             <a:effectLst/>
           </p:spPr>
@@ -5815,9 +5664,9 @@
               </a:pathLst>
             </a:custGeom>
             <a:grpFill/>
-            <a:ln cap="rnd">
+            <a:ln w="12700" cap="rnd">
               <a:solidFill>
-                <a:schemeClr val="bg1"/>
+                <a:srgbClr val="0070C0"/>
               </a:solidFill>
             </a:ln>
           </p:spPr>
@@ -5861,9 +5710,9 @@
               <a:avLst/>
             </a:prstGeom>
             <a:grpFill/>
-            <a:ln cap="rnd">
+            <a:ln w="12700" cap="rnd">
               <a:solidFill>
-                <a:schemeClr val="bg1"/>
+                <a:srgbClr val="0070C0"/>
               </a:solidFill>
             </a:ln>
           </p:spPr>
@@ -5899,9 +5748,9 @@
               <a:avLst/>
             </a:prstGeom>
             <a:grpFill/>
-            <a:ln cap="rnd">
+            <a:ln w="12700" cap="rnd">
               <a:solidFill>
-                <a:schemeClr val="bg1"/>
+                <a:srgbClr val="0070C0"/>
               </a:solidFill>
             </a:ln>
           </p:spPr>
@@ -5923,90 +5772,6 @@
           </p:style>
         </p:cxnSp>
       </p:grpSp>
-      <p:sp>
-        <p:nvSpPr>
-          <p:cNvPr id="167" name="Rectangle 4"/>
-          <p:cNvSpPr/>
-          <p:nvPr/>
-        </p:nvSpPr>
-        <p:spPr>
-          <a:xfrm>
-            <a:off x="1478476" y="4892423"/>
-            <a:ext cx="497764" cy="501644"/>
-          </a:xfrm>
-          <a:prstGeom prst="ellipse">
-            <a:avLst/>
-          </a:prstGeom>
-          <a:noFill/>
-          <a:ln w="57150" cmpd="sng">
-            <a:solidFill>
-              <a:srgbClr val="0070C0"/>
-            </a:solidFill>
-            <a:miter lim="800000"/>
-          </a:ln>
-        </p:spPr>
-        <p:style>
-          <a:lnRef idx="2">
-            <a:schemeClr val="accent1">
-              <a:shade val="50000"/>
-            </a:schemeClr>
-          </a:lnRef>
-          <a:fillRef idx="1">
-            <a:schemeClr val="accent1"/>
-          </a:fillRef>
-          <a:effectRef idx="0">
-            <a:schemeClr val="accent1"/>
-          </a:effectRef>
-          <a:fontRef idx="minor">
-            <a:schemeClr val="lt1"/>
-          </a:fontRef>
-        </p:style>
-        <p:txBody>
-          <a:bodyPr rtlCol="0" anchor="ctr"/>
-          <a:lstStyle/>
-          <a:p>
-            <a:pPr algn="ctr"/>
-            <a:endParaRPr lang="en-US" dirty="0"/>
-          </a:p>
-        </p:txBody>
-      </p:sp>
-      <p:sp>
-        <p:nvSpPr>
-          <p:cNvPr id="169" name="TextBox 168"/>
-          <p:cNvSpPr txBox="1"/>
-          <p:nvPr/>
-        </p:nvSpPr>
-        <p:spPr>
-          <a:xfrm>
-            <a:off x="1560063" y="4727746"/>
-            <a:ext cx="335348" cy="830997"/>
-          </a:xfrm>
-          <a:prstGeom prst="rect">
-            <a:avLst/>
-          </a:prstGeom>
-          <a:noFill/>
-          <a:scene3d>
-            <a:camera prst="perspectiveRelaxedModerately"/>
-            <a:lightRig rig="threePt" dir="t"/>
-          </a:scene3d>
-        </p:spPr>
-        <p:txBody>
-          <a:bodyPr wrap="none" rtlCol="0">
-            <a:spAutoFit/>
-          </a:bodyPr>
-          <a:lstStyle/>
-          <a:p>
-            <a:r>
-              <a:rPr lang="en-US" sz="4800" b="1" dirty="0">
-                <a:solidFill>
-                  <a:srgbClr val="0070C0"/>
-                </a:solidFill>
-              </a:rPr>
-              <a:t>i</a:t>
-            </a:r>
-          </a:p>
-        </p:txBody>
-      </p:sp>
       <p:grpSp>
         <p:nvGrpSpPr>
           <p:cNvPr id="16" name="Group 15"/>
@@ -6015,8 +5780,8 @@
         </p:nvGrpSpPr>
         <p:grpSpPr>
           <a:xfrm>
-            <a:off x="6179524" y="3164936"/>
-            <a:ext cx="449124" cy="526805"/>
+            <a:off x="2792510" y="3546554"/>
+            <a:ext cx="222449" cy="260924"/>
             <a:chOff x="6050774" y="2324289"/>
             <a:chExt cx="922593" cy="1082165"/>
           </a:xfrm>
@@ -6041,7 +5806,7 @@
               </a:avLst>
             </a:prstGeom>
             <a:grpFill/>
-            <a:ln>
+            <a:ln w="12700">
               <a:solidFill>
                 <a:srgbClr val="0070C0"/>
               </a:solidFill>
@@ -6089,7 +5854,7 @@
               </a:avLst>
             </a:prstGeom>
             <a:grpFill/>
-            <a:ln>
+            <a:ln w="12700">
               <a:solidFill>
                 <a:srgbClr val="0070C0"/>
               </a:solidFill>
@@ -6121,645 +5886,223 @@
           </p:txBody>
         </p:sp>
       </p:grpSp>
-      <p:sp>
-        <p:nvSpPr>
-          <p:cNvPr id="173" name="Freeform: Shape 172"/>
-          <p:cNvSpPr/>
-          <p:nvPr/>
-        </p:nvSpPr>
-        <p:spPr>
-          <a:xfrm>
-            <a:off x="361991" y="3439039"/>
-            <a:ext cx="239977" cy="423261"/>
-          </a:xfrm>
-          <a:custGeom>
-            <a:avLst/>
-            <a:gdLst>
-              <a:gd name="connsiteX0" fmla="*/ 621612 w 621612"/>
-              <a:gd name="connsiteY0" fmla="*/ 886289 h 891757"/>
-              <a:gd name="connsiteX1" fmla="*/ 621612 w 621612"/>
-              <a:gd name="connsiteY1" fmla="*/ 891757 h 891757"/>
-              <a:gd name="connsiteX2" fmla="*/ 620637 w 621612"/>
-              <a:gd name="connsiteY2" fmla="*/ 891757 h 891757"/>
-              <a:gd name="connsiteX3" fmla="*/ 0 w 621612"/>
-              <a:gd name="connsiteY3" fmla="*/ 886289 h 891757"/>
-              <a:gd name="connsiteX4" fmla="*/ 975 w 621612"/>
-              <a:gd name="connsiteY4" fmla="*/ 891757 h 891757"/>
-              <a:gd name="connsiteX5" fmla="*/ 0 w 621612"/>
-              <a:gd name="connsiteY5" fmla="*/ 891757 h 891757"/>
-              <a:gd name="connsiteX6" fmla="*/ 310806 w 621612"/>
-              <a:gd name="connsiteY6" fmla="*/ 0 h 891757"/>
-              <a:gd name="connsiteX7" fmla="*/ 621612 w 621612"/>
-              <a:gd name="connsiteY7" fmla="*/ 175673 h 891757"/>
-              <a:gd name="connsiteX8" fmla="*/ 621612 w 621612"/>
-              <a:gd name="connsiteY8" fmla="*/ 886289 h 891757"/>
-              <a:gd name="connsiteX9" fmla="*/ 310806 w 621612"/>
-              <a:gd name="connsiteY9" fmla="*/ 710616 h 891757"/>
-              <a:gd name="connsiteX10" fmla="*/ 0 w 621612"/>
-              <a:gd name="connsiteY10" fmla="*/ 886289 h 891757"/>
-              <a:gd name="connsiteX11" fmla="*/ 0 w 621612"/>
-              <a:gd name="connsiteY11" fmla="*/ 175673 h 891757"/>
-              <a:gd name="connsiteX12" fmla="*/ 310806 w 621612"/>
-              <a:gd name="connsiteY12" fmla="*/ 0 h 891757"/>
-            </a:gdLst>
-            <a:ahLst/>
-            <a:cxnLst>
-              <a:cxn ang="0">
-                <a:pos x="connsiteX0" y="connsiteY0"/>
-              </a:cxn>
-              <a:cxn ang="0">
-                <a:pos x="connsiteX1" y="connsiteY1"/>
-              </a:cxn>
-              <a:cxn ang="0">
-                <a:pos x="connsiteX2" y="connsiteY2"/>
-              </a:cxn>
-              <a:cxn ang="0">
-                <a:pos x="connsiteX3" y="connsiteY3"/>
-              </a:cxn>
-              <a:cxn ang="0">
-                <a:pos x="connsiteX4" y="connsiteY4"/>
-              </a:cxn>
-              <a:cxn ang="0">
-                <a:pos x="connsiteX5" y="connsiteY5"/>
-              </a:cxn>
-              <a:cxn ang="0">
-                <a:pos x="connsiteX6" y="connsiteY6"/>
-              </a:cxn>
-              <a:cxn ang="0">
-                <a:pos x="connsiteX7" y="connsiteY7"/>
-              </a:cxn>
-              <a:cxn ang="0">
-                <a:pos x="connsiteX8" y="connsiteY8"/>
-              </a:cxn>
-              <a:cxn ang="0">
-                <a:pos x="connsiteX9" y="connsiteY9"/>
-              </a:cxn>
-              <a:cxn ang="0">
-                <a:pos x="connsiteX10" y="connsiteY10"/>
-              </a:cxn>
-              <a:cxn ang="0">
-                <a:pos x="connsiteX11" y="connsiteY11"/>
-              </a:cxn>
-              <a:cxn ang="0">
-                <a:pos x="connsiteX12" y="connsiteY12"/>
-              </a:cxn>
-            </a:cxnLst>
-            <a:rect l="l" t="t" r="r" b="b"/>
-            <a:pathLst>
-              <a:path w="621612" h="891757">
-                <a:moveTo>
-                  <a:pt x="621612" y="886289"/>
-                </a:moveTo>
-                <a:lnTo>
-                  <a:pt x="621612" y="891757"/>
-                </a:lnTo>
-                <a:lnTo>
-                  <a:pt x="620637" y="891757"/>
-                </a:lnTo>
-                <a:close/>
-                <a:moveTo>
-                  <a:pt x="0" y="886289"/>
-                </a:moveTo>
-                <a:lnTo>
-                  <a:pt x="975" y="891757"/>
-                </a:lnTo>
-                <a:lnTo>
-                  <a:pt x="0" y="891757"/>
-                </a:lnTo>
-                <a:close/>
-                <a:moveTo>
-                  <a:pt x="310806" y="0"/>
-                </a:moveTo>
-                <a:cubicBezTo>
-                  <a:pt x="482459" y="0"/>
-                  <a:pt x="621612" y="78651"/>
-                  <a:pt x="621612" y="175673"/>
-                </a:cubicBezTo>
-                <a:lnTo>
-                  <a:pt x="621612" y="886289"/>
-                </a:lnTo>
-                <a:cubicBezTo>
-                  <a:pt x="621612" y="789267"/>
-                  <a:pt x="482459" y="710616"/>
-                  <a:pt x="310806" y="710616"/>
-                </a:cubicBezTo>
-                <a:cubicBezTo>
-                  <a:pt x="139153" y="710616"/>
-                  <a:pt x="0" y="789267"/>
-                  <a:pt x="0" y="886289"/>
-                </a:cubicBezTo>
-                <a:lnTo>
-                  <a:pt x="0" y="175673"/>
-                </a:lnTo>
-                <a:cubicBezTo>
-                  <a:pt x="0" y="78651"/>
-                  <a:pt x="139153" y="0"/>
-                  <a:pt x="310806" y="0"/>
-                </a:cubicBezTo>
-                <a:close/>
-              </a:path>
-            </a:pathLst>
-          </a:custGeom>
-          <a:solidFill>
-            <a:srgbClr val="0070C0"/>
-          </a:solidFill>
-          <a:ln>
-            <a:solidFill>
-              <a:srgbClr val="0070C0"/>
-            </a:solidFill>
-          </a:ln>
-        </p:spPr>
-        <p:style>
-          <a:lnRef idx="2">
-            <a:schemeClr val="accent1">
-              <a:shade val="50000"/>
-            </a:schemeClr>
-          </a:lnRef>
-          <a:fillRef idx="1">
-            <a:schemeClr val="accent1"/>
-          </a:fillRef>
-          <a:effectRef idx="0">
-            <a:schemeClr val="accent1"/>
-          </a:effectRef>
-          <a:fontRef idx="minor">
-            <a:schemeClr val="lt1"/>
-          </a:fontRef>
-        </p:style>
-        <p:txBody>
-          <a:bodyPr rtlCol="0" anchor="ctr"/>
-          <a:lstStyle/>
-          <a:p>
-            <a:pPr algn="ctr"/>
-            <a:endParaRPr lang="en-US"/>
-          </a:p>
-        </p:txBody>
-      </p:sp>
-      <p:sp>
-        <p:nvSpPr>
-          <p:cNvPr id="174" name="Freeform: Shape 173"/>
-          <p:cNvSpPr/>
-          <p:nvPr/>
-        </p:nvSpPr>
-        <p:spPr>
-          <a:xfrm>
-            <a:off x="601968" y="3432980"/>
-            <a:ext cx="239977" cy="423261"/>
-          </a:xfrm>
-          <a:custGeom>
-            <a:avLst/>
-            <a:gdLst>
-              <a:gd name="connsiteX0" fmla="*/ 621612 w 621612"/>
-              <a:gd name="connsiteY0" fmla="*/ 886289 h 891757"/>
-              <a:gd name="connsiteX1" fmla="*/ 621612 w 621612"/>
-              <a:gd name="connsiteY1" fmla="*/ 891757 h 891757"/>
-              <a:gd name="connsiteX2" fmla="*/ 620637 w 621612"/>
-              <a:gd name="connsiteY2" fmla="*/ 891757 h 891757"/>
-              <a:gd name="connsiteX3" fmla="*/ 0 w 621612"/>
-              <a:gd name="connsiteY3" fmla="*/ 886289 h 891757"/>
-              <a:gd name="connsiteX4" fmla="*/ 975 w 621612"/>
-              <a:gd name="connsiteY4" fmla="*/ 891757 h 891757"/>
-              <a:gd name="connsiteX5" fmla="*/ 0 w 621612"/>
-              <a:gd name="connsiteY5" fmla="*/ 891757 h 891757"/>
-              <a:gd name="connsiteX6" fmla="*/ 310806 w 621612"/>
-              <a:gd name="connsiteY6" fmla="*/ 0 h 891757"/>
-              <a:gd name="connsiteX7" fmla="*/ 621612 w 621612"/>
-              <a:gd name="connsiteY7" fmla="*/ 175673 h 891757"/>
-              <a:gd name="connsiteX8" fmla="*/ 621612 w 621612"/>
-              <a:gd name="connsiteY8" fmla="*/ 886289 h 891757"/>
-              <a:gd name="connsiteX9" fmla="*/ 310806 w 621612"/>
-              <a:gd name="connsiteY9" fmla="*/ 710616 h 891757"/>
-              <a:gd name="connsiteX10" fmla="*/ 0 w 621612"/>
-              <a:gd name="connsiteY10" fmla="*/ 886289 h 891757"/>
-              <a:gd name="connsiteX11" fmla="*/ 0 w 621612"/>
-              <a:gd name="connsiteY11" fmla="*/ 175673 h 891757"/>
-              <a:gd name="connsiteX12" fmla="*/ 310806 w 621612"/>
-              <a:gd name="connsiteY12" fmla="*/ 0 h 891757"/>
-            </a:gdLst>
-            <a:ahLst/>
-            <a:cxnLst>
-              <a:cxn ang="0">
-                <a:pos x="connsiteX0" y="connsiteY0"/>
-              </a:cxn>
-              <a:cxn ang="0">
-                <a:pos x="connsiteX1" y="connsiteY1"/>
-              </a:cxn>
-              <a:cxn ang="0">
-                <a:pos x="connsiteX2" y="connsiteY2"/>
-              </a:cxn>
-              <a:cxn ang="0">
-                <a:pos x="connsiteX3" y="connsiteY3"/>
-              </a:cxn>
-              <a:cxn ang="0">
-                <a:pos x="connsiteX4" y="connsiteY4"/>
-              </a:cxn>
-              <a:cxn ang="0">
-                <a:pos x="connsiteX5" y="connsiteY5"/>
-              </a:cxn>
-              <a:cxn ang="0">
-                <a:pos x="connsiteX6" y="connsiteY6"/>
-              </a:cxn>
-              <a:cxn ang="0">
-                <a:pos x="connsiteX7" y="connsiteY7"/>
-              </a:cxn>
-              <a:cxn ang="0">
-                <a:pos x="connsiteX8" y="connsiteY8"/>
-              </a:cxn>
-              <a:cxn ang="0">
-                <a:pos x="connsiteX9" y="connsiteY9"/>
-              </a:cxn>
-              <a:cxn ang="0">
-                <a:pos x="connsiteX10" y="connsiteY10"/>
-              </a:cxn>
-              <a:cxn ang="0">
-                <a:pos x="connsiteX11" y="connsiteY11"/>
-              </a:cxn>
-              <a:cxn ang="0">
-                <a:pos x="connsiteX12" y="connsiteY12"/>
-              </a:cxn>
-            </a:cxnLst>
-            <a:rect l="l" t="t" r="r" b="b"/>
-            <a:pathLst>
-              <a:path w="621612" h="891757">
-                <a:moveTo>
-                  <a:pt x="621612" y="886289"/>
-                </a:moveTo>
-                <a:lnTo>
-                  <a:pt x="621612" y="891757"/>
-                </a:lnTo>
-                <a:lnTo>
-                  <a:pt x="620637" y="891757"/>
-                </a:lnTo>
-                <a:close/>
-                <a:moveTo>
-                  <a:pt x="0" y="886289"/>
-                </a:moveTo>
-                <a:lnTo>
-                  <a:pt x="975" y="891757"/>
-                </a:lnTo>
-                <a:lnTo>
-                  <a:pt x="0" y="891757"/>
-                </a:lnTo>
-                <a:close/>
-                <a:moveTo>
-                  <a:pt x="310806" y="0"/>
-                </a:moveTo>
-                <a:cubicBezTo>
-                  <a:pt x="482459" y="0"/>
-                  <a:pt x="621612" y="78651"/>
-                  <a:pt x="621612" y="175673"/>
-                </a:cubicBezTo>
-                <a:lnTo>
-                  <a:pt x="621612" y="886289"/>
-                </a:lnTo>
-                <a:cubicBezTo>
-                  <a:pt x="621612" y="789267"/>
-                  <a:pt x="482459" y="710616"/>
-                  <a:pt x="310806" y="710616"/>
-                </a:cubicBezTo>
-                <a:cubicBezTo>
-                  <a:pt x="139153" y="710616"/>
-                  <a:pt x="0" y="789267"/>
-                  <a:pt x="0" y="886289"/>
-                </a:cubicBezTo>
-                <a:lnTo>
-                  <a:pt x="0" y="175673"/>
-                </a:lnTo>
-                <a:cubicBezTo>
-                  <a:pt x="0" y="78651"/>
-                  <a:pt x="139153" y="0"/>
-                  <a:pt x="310806" y="0"/>
-                </a:cubicBezTo>
-                <a:close/>
-              </a:path>
-            </a:pathLst>
-          </a:custGeom>
-          <a:solidFill>
-            <a:srgbClr val="0070C0"/>
-          </a:solidFill>
-          <a:ln>
-            <a:solidFill>
-              <a:srgbClr val="0070C0"/>
-            </a:solidFill>
-          </a:ln>
-        </p:spPr>
-        <p:style>
-          <a:lnRef idx="2">
-            <a:schemeClr val="accent1">
-              <a:shade val="50000"/>
-            </a:schemeClr>
-          </a:lnRef>
-          <a:fillRef idx="1">
-            <a:schemeClr val="accent1"/>
-          </a:fillRef>
-          <a:effectRef idx="0">
-            <a:schemeClr val="accent1"/>
-          </a:effectRef>
-          <a:fontRef idx="minor">
-            <a:schemeClr val="lt1"/>
-          </a:fontRef>
-        </p:style>
-        <p:txBody>
-          <a:bodyPr rtlCol="0" anchor="ctr"/>
-          <a:lstStyle/>
-          <a:p>
-            <a:pPr algn="ctr"/>
-            <a:endParaRPr lang="en-US"/>
-          </a:p>
-        </p:txBody>
-      </p:sp>
-      <p:sp>
-        <p:nvSpPr>
-          <p:cNvPr id="177" name="Freeform: Shape 176"/>
-          <p:cNvSpPr/>
-          <p:nvPr/>
-        </p:nvSpPr>
-        <p:spPr>
-          <a:xfrm>
-            <a:off x="357863" y="3388010"/>
-            <a:ext cx="488210" cy="395906"/>
-          </a:xfrm>
-          <a:custGeom>
-            <a:avLst/>
-            <a:gdLst>
-              <a:gd name="connsiteX0" fmla="*/ 621612 w 1243224"/>
-              <a:gd name="connsiteY0" fmla="*/ 899055 h 904523"/>
-              <a:gd name="connsiteX1" fmla="*/ 621612 w 1243224"/>
-              <a:gd name="connsiteY1" fmla="*/ 904523 h 904523"/>
-              <a:gd name="connsiteX2" fmla="*/ 620637 w 1243224"/>
-              <a:gd name="connsiteY2" fmla="*/ 904523 h 904523"/>
-              <a:gd name="connsiteX3" fmla="*/ 0 w 1243224"/>
-              <a:gd name="connsiteY3" fmla="*/ 899055 h 904523"/>
-              <a:gd name="connsiteX4" fmla="*/ 975 w 1243224"/>
-              <a:gd name="connsiteY4" fmla="*/ 904523 h 904523"/>
-              <a:gd name="connsiteX5" fmla="*/ 0 w 1243224"/>
-              <a:gd name="connsiteY5" fmla="*/ 904523 h 904523"/>
-              <a:gd name="connsiteX6" fmla="*/ 1243224 w 1243224"/>
-              <a:gd name="connsiteY6" fmla="*/ 886289 h 904523"/>
-              <a:gd name="connsiteX7" fmla="*/ 1243224 w 1243224"/>
-              <a:gd name="connsiteY7" fmla="*/ 891757 h 904523"/>
-              <a:gd name="connsiteX8" fmla="*/ 1242249 w 1243224"/>
-              <a:gd name="connsiteY8" fmla="*/ 891757 h 904523"/>
-              <a:gd name="connsiteX9" fmla="*/ 932418 w 1243224"/>
-              <a:gd name="connsiteY9" fmla="*/ 0 h 904523"/>
-              <a:gd name="connsiteX10" fmla="*/ 1243224 w 1243224"/>
-              <a:gd name="connsiteY10" fmla="*/ 175673 h 904523"/>
-              <a:gd name="connsiteX11" fmla="*/ 1243224 w 1243224"/>
-              <a:gd name="connsiteY11" fmla="*/ 886289 h 904523"/>
-              <a:gd name="connsiteX12" fmla="*/ 932418 w 1243224"/>
-              <a:gd name="connsiteY12" fmla="*/ 710616 h 904523"/>
-              <a:gd name="connsiteX13" fmla="*/ 621612 w 1243224"/>
-              <a:gd name="connsiteY13" fmla="*/ 886289 h 904523"/>
-              <a:gd name="connsiteX14" fmla="*/ 622587 w 1243224"/>
-              <a:gd name="connsiteY14" fmla="*/ 891757 h 904523"/>
-              <a:gd name="connsiteX15" fmla="*/ 621612 w 1243224"/>
-              <a:gd name="connsiteY15" fmla="*/ 891757 h 904523"/>
-              <a:gd name="connsiteX16" fmla="*/ 621612 w 1243224"/>
-              <a:gd name="connsiteY16" fmla="*/ 899055 h 904523"/>
-              <a:gd name="connsiteX17" fmla="*/ 310806 w 1243224"/>
-              <a:gd name="connsiteY17" fmla="*/ 723382 h 904523"/>
-              <a:gd name="connsiteX18" fmla="*/ 0 w 1243224"/>
-              <a:gd name="connsiteY18" fmla="*/ 899055 h 904523"/>
-              <a:gd name="connsiteX19" fmla="*/ 0 w 1243224"/>
-              <a:gd name="connsiteY19" fmla="*/ 188439 h 904523"/>
-              <a:gd name="connsiteX20" fmla="*/ 310806 w 1243224"/>
-              <a:gd name="connsiteY20" fmla="*/ 12766 h 904523"/>
-              <a:gd name="connsiteX21" fmla="*/ 621612 w 1243224"/>
-              <a:gd name="connsiteY21" fmla="*/ 188439 h 904523"/>
-              <a:gd name="connsiteX22" fmla="*/ 621612 w 1243224"/>
-              <a:gd name="connsiteY22" fmla="*/ 175673 h 904523"/>
-              <a:gd name="connsiteX23" fmla="*/ 932418 w 1243224"/>
-              <a:gd name="connsiteY23" fmla="*/ 0 h 904523"/>
-            </a:gdLst>
-            <a:ahLst/>
-            <a:cxnLst>
-              <a:cxn ang="0">
-                <a:pos x="connsiteX0" y="connsiteY0"/>
-              </a:cxn>
-              <a:cxn ang="0">
-                <a:pos x="connsiteX1" y="connsiteY1"/>
-              </a:cxn>
-              <a:cxn ang="0">
-                <a:pos x="connsiteX2" y="connsiteY2"/>
-              </a:cxn>
-              <a:cxn ang="0">
-                <a:pos x="connsiteX3" y="connsiteY3"/>
-              </a:cxn>
-              <a:cxn ang="0">
-                <a:pos x="connsiteX4" y="connsiteY4"/>
-              </a:cxn>
-              <a:cxn ang="0">
-                <a:pos x="connsiteX5" y="connsiteY5"/>
-              </a:cxn>
-              <a:cxn ang="0">
-                <a:pos x="connsiteX6" y="connsiteY6"/>
-              </a:cxn>
-              <a:cxn ang="0">
-                <a:pos x="connsiteX7" y="connsiteY7"/>
-              </a:cxn>
-              <a:cxn ang="0">
-                <a:pos x="connsiteX8" y="connsiteY8"/>
-              </a:cxn>
-              <a:cxn ang="0">
-                <a:pos x="connsiteX9" y="connsiteY9"/>
-              </a:cxn>
-              <a:cxn ang="0">
-                <a:pos x="connsiteX10" y="connsiteY10"/>
-              </a:cxn>
-              <a:cxn ang="0">
-                <a:pos x="connsiteX11" y="connsiteY11"/>
-              </a:cxn>
-              <a:cxn ang="0">
-                <a:pos x="connsiteX12" y="connsiteY12"/>
-              </a:cxn>
-              <a:cxn ang="0">
-                <a:pos x="connsiteX13" y="connsiteY13"/>
-              </a:cxn>
-              <a:cxn ang="0">
-                <a:pos x="connsiteX14" y="connsiteY14"/>
-              </a:cxn>
-              <a:cxn ang="0">
-                <a:pos x="connsiteX15" y="connsiteY15"/>
-              </a:cxn>
-              <a:cxn ang="0">
-                <a:pos x="connsiteX16" y="connsiteY16"/>
-              </a:cxn>
-              <a:cxn ang="0">
-                <a:pos x="connsiteX17" y="connsiteY17"/>
-              </a:cxn>
-              <a:cxn ang="0">
-                <a:pos x="connsiteX18" y="connsiteY18"/>
-              </a:cxn>
-              <a:cxn ang="0">
-                <a:pos x="connsiteX19" y="connsiteY19"/>
-              </a:cxn>
-              <a:cxn ang="0">
-                <a:pos x="connsiteX20" y="connsiteY20"/>
-              </a:cxn>
-              <a:cxn ang="0">
-                <a:pos x="connsiteX21" y="connsiteY21"/>
-              </a:cxn>
-              <a:cxn ang="0">
-                <a:pos x="connsiteX22" y="connsiteY22"/>
-              </a:cxn>
-              <a:cxn ang="0">
-                <a:pos x="connsiteX23" y="connsiteY23"/>
-              </a:cxn>
-            </a:cxnLst>
-            <a:rect l="l" t="t" r="r" b="b"/>
-            <a:pathLst>
-              <a:path w="1243224" h="904523">
-                <a:moveTo>
-                  <a:pt x="621612" y="899055"/>
-                </a:moveTo>
-                <a:lnTo>
-                  <a:pt x="621612" y="904523"/>
-                </a:lnTo>
-                <a:lnTo>
-                  <a:pt x="620637" y="904523"/>
-                </a:lnTo>
-                <a:close/>
-                <a:moveTo>
-                  <a:pt x="0" y="899055"/>
-                </a:moveTo>
-                <a:lnTo>
-                  <a:pt x="975" y="904523"/>
-                </a:lnTo>
-                <a:lnTo>
-                  <a:pt x="0" y="904523"/>
-                </a:lnTo>
-                <a:close/>
-                <a:moveTo>
-                  <a:pt x="1243224" y="886289"/>
-                </a:moveTo>
-                <a:lnTo>
-                  <a:pt x="1243224" y="891757"/>
-                </a:lnTo>
-                <a:lnTo>
-                  <a:pt x="1242249" y="891757"/>
-                </a:lnTo>
-                <a:close/>
-                <a:moveTo>
-                  <a:pt x="932418" y="0"/>
-                </a:moveTo>
-                <a:cubicBezTo>
-                  <a:pt x="1104071" y="0"/>
-                  <a:pt x="1243224" y="78651"/>
-                  <a:pt x="1243224" y="175673"/>
-                </a:cubicBezTo>
-                <a:lnTo>
-                  <a:pt x="1243224" y="886289"/>
-                </a:lnTo>
-                <a:cubicBezTo>
-                  <a:pt x="1243224" y="789267"/>
-                  <a:pt x="1104071" y="710616"/>
-                  <a:pt x="932418" y="710616"/>
-                </a:cubicBezTo>
-                <a:cubicBezTo>
-                  <a:pt x="760765" y="710616"/>
-                  <a:pt x="621612" y="789267"/>
-                  <a:pt x="621612" y="886289"/>
-                </a:cubicBezTo>
-                <a:lnTo>
-                  <a:pt x="622587" y="891757"/>
-                </a:lnTo>
-                <a:lnTo>
-                  <a:pt x="621612" y="891757"/>
-                </a:lnTo>
-                <a:lnTo>
-                  <a:pt x="621612" y="899055"/>
-                </a:lnTo>
-                <a:cubicBezTo>
-                  <a:pt x="621612" y="802033"/>
-                  <a:pt x="482459" y="723382"/>
-                  <a:pt x="310806" y="723382"/>
-                </a:cubicBezTo>
-                <a:cubicBezTo>
-                  <a:pt x="139153" y="723382"/>
-                  <a:pt x="0" y="802033"/>
-                  <a:pt x="0" y="899055"/>
-                </a:cubicBezTo>
-                <a:lnTo>
-                  <a:pt x="0" y="188439"/>
-                </a:lnTo>
-                <a:cubicBezTo>
-                  <a:pt x="0" y="91417"/>
-                  <a:pt x="139153" y="12766"/>
-                  <a:pt x="310806" y="12766"/>
-                </a:cubicBezTo>
-                <a:cubicBezTo>
-                  <a:pt x="482459" y="12766"/>
-                  <a:pt x="621612" y="91417"/>
-                  <a:pt x="621612" y="188439"/>
-                </a:cubicBezTo>
-                <a:lnTo>
-                  <a:pt x="621612" y="175673"/>
-                </a:lnTo>
-                <a:cubicBezTo>
-                  <a:pt x="621612" y="78651"/>
-                  <a:pt x="760765" y="0"/>
-                  <a:pt x="932418" y="0"/>
-                </a:cubicBezTo>
-                <a:close/>
-              </a:path>
-            </a:pathLst>
-          </a:custGeom>
-          <a:solidFill>
-            <a:srgbClr val="F79646"/>
-          </a:solidFill>
-          <a:ln w="19050">
-            <a:solidFill>
-              <a:srgbClr val="0070C0"/>
-            </a:solidFill>
-          </a:ln>
-        </p:spPr>
-        <p:style>
-          <a:lnRef idx="2">
-            <a:schemeClr val="accent1">
-              <a:shade val="50000"/>
-            </a:schemeClr>
-          </a:lnRef>
-          <a:fillRef idx="1">
-            <a:schemeClr val="accent1"/>
-          </a:fillRef>
-          <a:effectRef idx="0">
-            <a:schemeClr val="accent1"/>
-          </a:effectRef>
-          <a:fontRef idx="minor">
-            <a:schemeClr val="lt1"/>
-          </a:fontRef>
-        </p:style>
-        <p:txBody>
-          <a:bodyPr rtlCol="0" anchor="ctr"/>
-          <a:lstStyle/>
-          <a:p>
-            <a:pPr algn="ctr"/>
-            <a:endParaRPr lang="en-US"/>
-          </a:p>
-        </p:txBody>
-      </p:sp>
       <p:grpSp>
         <p:nvGrpSpPr>
-          <p:cNvPr id="24" name="Group 23"/>
+          <p:cNvPr id="73" name="Group 72"/>
           <p:cNvGrpSpPr/>
           <p:nvPr/>
         </p:nvGrpSpPr>
         <p:grpSpPr>
           <a:xfrm>
-            <a:off x="1020294" y="3376533"/>
-            <a:ext cx="721408" cy="530760"/>
-            <a:chOff x="2616925" y="4478055"/>
-            <a:chExt cx="1884882" cy="1386760"/>
+            <a:off x="1182045" y="3582382"/>
+            <a:ext cx="357768" cy="255032"/>
+            <a:chOff x="2616925" y="4524538"/>
+            <a:chExt cx="1884882" cy="1341314"/>
           </a:xfrm>
+          <a:solidFill>
+            <a:srgbClr val="0070C0"/>
+          </a:solidFill>
         </p:grpSpPr>
         <p:sp>
           <p:nvSpPr>
-            <p:cNvPr id="192" name="Freeform: Shape 191"/>
+            <p:cNvPr id="75" name="Freeform: Shape 74"/>
             <p:cNvSpPr/>
             <p:nvPr/>
           </p:nvSpPr>
           <p:spPr>
             <a:xfrm>
-              <a:off x="2616925" y="4517335"/>
+              <a:off x="2616925" y="4525576"/>
+              <a:ext cx="945527" cy="1340276"/>
+            </a:xfrm>
+            <a:custGeom>
+              <a:avLst/>
+              <a:gdLst>
+                <a:gd name="connsiteX0" fmla="*/ 432909 w 1389590"/>
+                <a:gd name="connsiteY0" fmla="*/ 0 h 1969730"/>
+                <a:gd name="connsiteX1" fmla="*/ 1240204 w 1389590"/>
+                <a:gd name="connsiteY1" fmla="*/ 165384 h 1969730"/>
+                <a:gd name="connsiteX2" fmla="*/ 1378194 w 1389590"/>
+                <a:gd name="connsiteY2" fmla="*/ 248100 h 1969730"/>
+                <a:gd name="connsiteX3" fmla="*/ 1378194 w 1389590"/>
+                <a:gd name="connsiteY3" fmla="*/ 254482 h 1969730"/>
+                <a:gd name="connsiteX4" fmla="*/ 1389590 w 1389590"/>
+                <a:gd name="connsiteY4" fmla="*/ 254482 h 1969730"/>
+                <a:gd name="connsiteX5" fmla="*/ 1389590 w 1389590"/>
+                <a:gd name="connsiteY5" fmla="*/ 1969730 h 1969730"/>
+                <a:gd name="connsiteX6" fmla="*/ 1389362 w 1389590"/>
+                <a:gd name="connsiteY6" fmla="*/ 1969730 h 1969730"/>
+                <a:gd name="connsiteX7" fmla="*/ 1328395 w 1389590"/>
+                <a:gd name="connsiteY7" fmla="*/ 1929407 h 1969730"/>
+                <a:gd name="connsiteX8" fmla="*/ 447414 w 1389590"/>
+                <a:gd name="connsiteY8" fmla="*/ 1723925 h 1969730"/>
+                <a:gd name="connsiteX9" fmla="*/ 3018 w 1389590"/>
+                <a:gd name="connsiteY9" fmla="*/ 1768299 h 1969730"/>
+                <a:gd name="connsiteX10" fmla="*/ 0 w 1389590"/>
+                <a:gd name="connsiteY10" fmla="*/ 1769109 h 1969730"/>
+                <a:gd name="connsiteX11" fmla="*/ 0 w 1389590"/>
+                <a:gd name="connsiteY11" fmla="*/ 254482 h 1969730"/>
+                <a:gd name="connsiteX12" fmla="*/ 2355 w 1389590"/>
+                <a:gd name="connsiteY12" fmla="*/ 254482 h 1969730"/>
+                <a:gd name="connsiteX13" fmla="*/ 2355 w 1389590"/>
+                <a:gd name="connsiteY13" fmla="*/ 42248 h 1969730"/>
+                <a:gd name="connsiteX14" fmla="*/ 202820 w 1389590"/>
+                <a:gd name="connsiteY14" fmla="*/ 11472 h 1969730"/>
+                <a:gd name="connsiteX15" fmla="*/ 432909 w 1389590"/>
+                <a:gd name="connsiteY15" fmla="*/ 0 h 1969730"/>
+              </a:gdLst>
+              <a:ahLst/>
+              <a:cxnLst>
+                <a:cxn ang="0">
+                  <a:pos x="connsiteX0" y="connsiteY0"/>
+                </a:cxn>
+                <a:cxn ang="0">
+                  <a:pos x="connsiteX1" y="connsiteY1"/>
+                </a:cxn>
+                <a:cxn ang="0">
+                  <a:pos x="connsiteX2" y="connsiteY2"/>
+                </a:cxn>
+                <a:cxn ang="0">
+                  <a:pos x="connsiteX3" y="connsiteY3"/>
+                </a:cxn>
+                <a:cxn ang="0">
+                  <a:pos x="connsiteX4" y="connsiteY4"/>
+                </a:cxn>
+                <a:cxn ang="0">
+                  <a:pos x="connsiteX5" y="connsiteY5"/>
+                </a:cxn>
+                <a:cxn ang="0">
+                  <a:pos x="connsiteX6" y="connsiteY6"/>
+                </a:cxn>
+                <a:cxn ang="0">
+                  <a:pos x="connsiteX7" y="connsiteY7"/>
+                </a:cxn>
+                <a:cxn ang="0">
+                  <a:pos x="connsiteX8" y="connsiteY8"/>
+                </a:cxn>
+                <a:cxn ang="0">
+                  <a:pos x="connsiteX9" y="connsiteY9"/>
+                </a:cxn>
+                <a:cxn ang="0">
+                  <a:pos x="connsiteX10" y="connsiteY10"/>
+                </a:cxn>
+                <a:cxn ang="0">
+                  <a:pos x="connsiteX11" y="connsiteY11"/>
+                </a:cxn>
+                <a:cxn ang="0">
+                  <a:pos x="connsiteX12" y="connsiteY12"/>
+                </a:cxn>
+                <a:cxn ang="0">
+                  <a:pos x="connsiteX13" y="connsiteY13"/>
+                </a:cxn>
+                <a:cxn ang="0">
+                  <a:pos x="connsiteX14" y="connsiteY14"/>
+                </a:cxn>
+                <a:cxn ang="0">
+                  <a:pos x="connsiteX15" y="connsiteY15"/>
+                </a:cxn>
+              </a:cxnLst>
+              <a:rect l="l" t="t" r="r" b="b"/>
+              <a:pathLst>
+                <a:path w="1389590" h="1969730">
+                  <a:moveTo>
+                    <a:pt x="432909" y="0"/>
+                  </a:moveTo>
+                  <a:cubicBezTo>
+                    <a:pt x="748177" y="0"/>
+                    <a:pt x="1033599" y="63201"/>
+                    <a:pt x="1240204" y="165384"/>
+                  </a:cubicBezTo>
+                  <a:lnTo>
+                    <a:pt x="1378194" y="248100"/>
+                  </a:lnTo>
+                  <a:lnTo>
+                    <a:pt x="1378194" y="254482"/>
+                  </a:lnTo>
+                  <a:lnTo>
+                    <a:pt x="1389590" y="254482"/>
+                  </a:lnTo>
+                  <a:lnTo>
+                    <a:pt x="1389590" y="1969730"/>
+                  </a:lnTo>
+                  <a:lnTo>
+                    <a:pt x="1389362" y="1969730"/>
+                  </a:lnTo>
+                  <a:lnTo>
+                    <a:pt x="1328395" y="1929407"/>
+                  </a:lnTo>
+                  <a:cubicBezTo>
+                    <a:pt x="1118993" y="1803914"/>
+                    <a:pt x="802091" y="1723925"/>
+                    <a:pt x="447414" y="1723925"/>
+                  </a:cubicBezTo>
+                  <a:cubicBezTo>
+                    <a:pt x="289780" y="1723925"/>
+                    <a:pt x="139608" y="1739725"/>
+                    <a:pt x="3018" y="1768299"/>
+                  </a:cubicBezTo>
+                  <a:lnTo>
+                    <a:pt x="0" y="1769109"/>
+                  </a:lnTo>
+                  <a:lnTo>
+                    <a:pt x="0" y="254482"/>
+                  </a:lnTo>
+                  <a:lnTo>
+                    <a:pt x="2355" y="254482"/>
+                  </a:lnTo>
+                  <a:lnTo>
+                    <a:pt x="2355" y="42248"/>
+                  </a:lnTo>
+                  <a:lnTo>
+                    <a:pt x="202820" y="11472"/>
+                  </a:lnTo>
+                  <a:cubicBezTo>
+                    <a:pt x="277141" y="3950"/>
+                    <a:pt x="354092" y="0"/>
+                    <a:pt x="432909" y="0"/>
+                  </a:cubicBezTo>
+                  <a:close/>
+                </a:path>
+              </a:pathLst>
+            </a:custGeom>
+            <a:grpFill/>
+            <a:ln>
+              <a:noFill/>
+            </a:ln>
+          </p:spPr>
+          <p:style>
+            <a:lnRef idx="2">
+              <a:schemeClr val="accent1">
+                <a:shade val="50000"/>
+              </a:schemeClr>
+            </a:lnRef>
+            <a:fillRef idx="1">
+              <a:schemeClr val="accent1"/>
+            </a:fillRef>
+            <a:effectRef idx="0">
+              <a:schemeClr val="accent1"/>
+            </a:effectRef>
+            <a:fontRef idx="minor">
+              <a:schemeClr val="lt1"/>
+            </a:fontRef>
+          </p:style>
+          <p:txBody>
+            <a:bodyPr rtlCol="0" anchor="ctr"/>
+            <a:lstStyle/>
+            <a:p>
+              <a:pPr algn="ctr"/>
+              <a:endParaRPr lang="en-US"/>
+            </a:p>
+          </p:txBody>
+        </p:sp>
+        <p:sp>
+          <p:nvSpPr>
+            <p:cNvPr id="77" name="Freeform: Shape 76"/>
+            <p:cNvSpPr/>
+            <p:nvPr/>
+          </p:nvSpPr>
+          <p:spPr>
+            <a:xfrm flipH="1">
+              <a:off x="3556279" y="4524538"/>
               <a:ext cx="945528" cy="1340277"/>
             </a:xfrm>
             <a:custGeom>
@@ -6912,9 +6255,216 @@
                 </a:path>
               </a:pathLst>
             </a:custGeom>
-            <a:solidFill>
-              <a:srgbClr val="0070C0"/>
-            </a:solidFill>
+            <a:grpFill/>
+            <a:ln>
+              <a:noFill/>
+            </a:ln>
+          </p:spPr>
+          <p:style>
+            <a:lnRef idx="2">
+              <a:schemeClr val="accent1">
+                <a:shade val="50000"/>
+              </a:schemeClr>
+            </a:lnRef>
+            <a:fillRef idx="1">
+              <a:schemeClr val="accent1"/>
+            </a:fillRef>
+            <a:effectRef idx="0">
+              <a:schemeClr val="accent1"/>
+            </a:effectRef>
+            <a:fontRef idx="minor">
+              <a:schemeClr val="lt1"/>
+            </a:fontRef>
+          </p:style>
+          <p:txBody>
+            <a:bodyPr rtlCol="0" anchor="ctr"/>
+            <a:lstStyle/>
+            <a:p>
+              <a:pPr algn="ctr"/>
+              <a:endParaRPr lang="en-US"/>
+            </a:p>
+          </p:txBody>
+        </p:sp>
+      </p:grpSp>
+      <p:grpSp>
+        <p:nvGrpSpPr>
+          <p:cNvPr id="24" name="Group 23"/>
+          <p:cNvGrpSpPr/>
+          <p:nvPr/>
+        </p:nvGrpSpPr>
+        <p:grpSpPr>
+          <a:xfrm>
+            <a:off x="1182045" y="3617937"/>
+            <a:ext cx="357768" cy="255032"/>
+            <a:chOff x="2616925" y="4524538"/>
+            <a:chExt cx="1884882" cy="1341314"/>
+          </a:xfrm>
+          <a:solidFill>
+            <a:srgbClr val="0070C0"/>
+          </a:solidFill>
+        </p:grpSpPr>
+        <p:sp>
+          <p:nvSpPr>
+            <p:cNvPr id="192" name="Freeform: Shape 191"/>
+            <p:cNvSpPr/>
+            <p:nvPr/>
+          </p:nvSpPr>
+          <p:spPr>
+            <a:xfrm>
+              <a:off x="2616925" y="4525576"/>
+              <a:ext cx="945527" cy="1340276"/>
+            </a:xfrm>
+            <a:custGeom>
+              <a:avLst/>
+              <a:gdLst>
+                <a:gd name="connsiteX0" fmla="*/ 432909 w 1389590"/>
+                <a:gd name="connsiteY0" fmla="*/ 0 h 1969730"/>
+                <a:gd name="connsiteX1" fmla="*/ 1240204 w 1389590"/>
+                <a:gd name="connsiteY1" fmla="*/ 165384 h 1969730"/>
+                <a:gd name="connsiteX2" fmla="*/ 1378194 w 1389590"/>
+                <a:gd name="connsiteY2" fmla="*/ 248100 h 1969730"/>
+                <a:gd name="connsiteX3" fmla="*/ 1378194 w 1389590"/>
+                <a:gd name="connsiteY3" fmla="*/ 254482 h 1969730"/>
+                <a:gd name="connsiteX4" fmla="*/ 1389590 w 1389590"/>
+                <a:gd name="connsiteY4" fmla="*/ 254482 h 1969730"/>
+                <a:gd name="connsiteX5" fmla="*/ 1389590 w 1389590"/>
+                <a:gd name="connsiteY5" fmla="*/ 1969730 h 1969730"/>
+                <a:gd name="connsiteX6" fmla="*/ 1389362 w 1389590"/>
+                <a:gd name="connsiteY6" fmla="*/ 1969730 h 1969730"/>
+                <a:gd name="connsiteX7" fmla="*/ 1328395 w 1389590"/>
+                <a:gd name="connsiteY7" fmla="*/ 1929407 h 1969730"/>
+                <a:gd name="connsiteX8" fmla="*/ 447414 w 1389590"/>
+                <a:gd name="connsiteY8" fmla="*/ 1723925 h 1969730"/>
+                <a:gd name="connsiteX9" fmla="*/ 3018 w 1389590"/>
+                <a:gd name="connsiteY9" fmla="*/ 1768299 h 1969730"/>
+                <a:gd name="connsiteX10" fmla="*/ 0 w 1389590"/>
+                <a:gd name="connsiteY10" fmla="*/ 1769109 h 1969730"/>
+                <a:gd name="connsiteX11" fmla="*/ 0 w 1389590"/>
+                <a:gd name="connsiteY11" fmla="*/ 254482 h 1969730"/>
+                <a:gd name="connsiteX12" fmla="*/ 2355 w 1389590"/>
+                <a:gd name="connsiteY12" fmla="*/ 254482 h 1969730"/>
+                <a:gd name="connsiteX13" fmla="*/ 2355 w 1389590"/>
+                <a:gd name="connsiteY13" fmla="*/ 42248 h 1969730"/>
+                <a:gd name="connsiteX14" fmla="*/ 202820 w 1389590"/>
+                <a:gd name="connsiteY14" fmla="*/ 11472 h 1969730"/>
+                <a:gd name="connsiteX15" fmla="*/ 432909 w 1389590"/>
+                <a:gd name="connsiteY15" fmla="*/ 0 h 1969730"/>
+              </a:gdLst>
+              <a:ahLst/>
+              <a:cxnLst>
+                <a:cxn ang="0">
+                  <a:pos x="connsiteX0" y="connsiteY0"/>
+                </a:cxn>
+                <a:cxn ang="0">
+                  <a:pos x="connsiteX1" y="connsiteY1"/>
+                </a:cxn>
+                <a:cxn ang="0">
+                  <a:pos x="connsiteX2" y="connsiteY2"/>
+                </a:cxn>
+                <a:cxn ang="0">
+                  <a:pos x="connsiteX3" y="connsiteY3"/>
+                </a:cxn>
+                <a:cxn ang="0">
+                  <a:pos x="connsiteX4" y="connsiteY4"/>
+                </a:cxn>
+                <a:cxn ang="0">
+                  <a:pos x="connsiteX5" y="connsiteY5"/>
+                </a:cxn>
+                <a:cxn ang="0">
+                  <a:pos x="connsiteX6" y="connsiteY6"/>
+                </a:cxn>
+                <a:cxn ang="0">
+                  <a:pos x="connsiteX7" y="connsiteY7"/>
+                </a:cxn>
+                <a:cxn ang="0">
+                  <a:pos x="connsiteX8" y="connsiteY8"/>
+                </a:cxn>
+                <a:cxn ang="0">
+                  <a:pos x="connsiteX9" y="connsiteY9"/>
+                </a:cxn>
+                <a:cxn ang="0">
+                  <a:pos x="connsiteX10" y="connsiteY10"/>
+                </a:cxn>
+                <a:cxn ang="0">
+                  <a:pos x="connsiteX11" y="connsiteY11"/>
+                </a:cxn>
+                <a:cxn ang="0">
+                  <a:pos x="connsiteX12" y="connsiteY12"/>
+                </a:cxn>
+                <a:cxn ang="0">
+                  <a:pos x="connsiteX13" y="connsiteY13"/>
+                </a:cxn>
+                <a:cxn ang="0">
+                  <a:pos x="connsiteX14" y="connsiteY14"/>
+                </a:cxn>
+                <a:cxn ang="0">
+                  <a:pos x="connsiteX15" y="connsiteY15"/>
+                </a:cxn>
+              </a:cxnLst>
+              <a:rect l="l" t="t" r="r" b="b"/>
+              <a:pathLst>
+                <a:path w="1389590" h="1969730">
+                  <a:moveTo>
+                    <a:pt x="432909" y="0"/>
+                  </a:moveTo>
+                  <a:cubicBezTo>
+                    <a:pt x="748177" y="0"/>
+                    <a:pt x="1033599" y="63201"/>
+                    <a:pt x="1240204" y="165384"/>
+                  </a:cubicBezTo>
+                  <a:lnTo>
+                    <a:pt x="1378194" y="248100"/>
+                  </a:lnTo>
+                  <a:lnTo>
+                    <a:pt x="1378194" y="254482"/>
+                  </a:lnTo>
+                  <a:lnTo>
+                    <a:pt x="1389590" y="254482"/>
+                  </a:lnTo>
+                  <a:lnTo>
+                    <a:pt x="1389590" y="1969730"/>
+                  </a:lnTo>
+                  <a:lnTo>
+                    <a:pt x="1389362" y="1969730"/>
+                  </a:lnTo>
+                  <a:lnTo>
+                    <a:pt x="1328395" y="1929407"/>
+                  </a:lnTo>
+                  <a:cubicBezTo>
+                    <a:pt x="1118993" y="1803914"/>
+                    <a:pt x="802091" y="1723925"/>
+                    <a:pt x="447414" y="1723925"/>
+                  </a:cubicBezTo>
+                  <a:cubicBezTo>
+                    <a:pt x="289780" y="1723925"/>
+                    <a:pt x="139608" y="1739725"/>
+                    <a:pt x="3018" y="1768299"/>
+                  </a:cubicBezTo>
+                  <a:lnTo>
+                    <a:pt x="0" y="1769109"/>
+                  </a:lnTo>
+                  <a:lnTo>
+                    <a:pt x="0" y="254482"/>
+                  </a:lnTo>
+                  <a:lnTo>
+                    <a:pt x="2355" y="254482"/>
+                  </a:lnTo>
+                  <a:lnTo>
+                    <a:pt x="2355" y="42248"/>
+                  </a:lnTo>
+                  <a:lnTo>
+                    <a:pt x="202820" y="11472"/>
+                  </a:lnTo>
+                  <a:cubicBezTo>
+                    <a:pt x="277141" y="3950"/>
+                    <a:pt x="354092" y="0"/>
+                    <a:pt x="432909" y="0"/>
+                  </a:cubicBezTo>
+                  <a:close/>
+                </a:path>
+              </a:pathLst>
+            </a:custGeom>
+            <a:grpFill/>
             <a:ln>
               <a:noFill/>
             </a:ln>
@@ -7105,9 +6655,216 @@
                 </a:path>
               </a:pathLst>
             </a:custGeom>
-            <a:solidFill>
-              <a:srgbClr val="0070C0"/>
-            </a:solidFill>
+            <a:grpFill/>
+            <a:ln>
+              <a:noFill/>
+            </a:ln>
+          </p:spPr>
+          <p:style>
+            <a:lnRef idx="2">
+              <a:schemeClr val="accent1">
+                <a:shade val="50000"/>
+              </a:schemeClr>
+            </a:lnRef>
+            <a:fillRef idx="1">
+              <a:schemeClr val="accent1"/>
+            </a:fillRef>
+            <a:effectRef idx="0">
+              <a:schemeClr val="accent1"/>
+            </a:effectRef>
+            <a:fontRef idx="minor">
+              <a:schemeClr val="lt1"/>
+            </a:fontRef>
+          </p:style>
+          <p:txBody>
+            <a:bodyPr rtlCol="0" anchor="ctr"/>
+            <a:lstStyle/>
+            <a:p>
+              <a:pPr algn="ctr"/>
+              <a:endParaRPr lang="en-US"/>
+            </a:p>
+          </p:txBody>
+        </p:sp>
+      </p:grpSp>
+      <p:grpSp>
+        <p:nvGrpSpPr>
+          <p:cNvPr id="68" name="Group 67"/>
+          <p:cNvGrpSpPr/>
+          <p:nvPr/>
+        </p:nvGrpSpPr>
+        <p:grpSpPr>
+          <a:xfrm>
+            <a:off x="1206474" y="3580724"/>
+            <a:ext cx="307331" cy="234509"/>
+            <a:chOff x="2616925" y="4524538"/>
+            <a:chExt cx="1884882" cy="1341314"/>
+          </a:xfrm>
+          <a:solidFill>
+            <a:srgbClr val="F8A15A"/>
+          </a:solidFill>
+        </p:grpSpPr>
+        <p:sp>
+          <p:nvSpPr>
+            <p:cNvPr id="69" name="Freeform: Shape 68"/>
+            <p:cNvSpPr/>
+            <p:nvPr/>
+          </p:nvSpPr>
+          <p:spPr>
+            <a:xfrm>
+              <a:off x="2616925" y="4525576"/>
+              <a:ext cx="945527" cy="1340276"/>
+            </a:xfrm>
+            <a:custGeom>
+              <a:avLst/>
+              <a:gdLst>
+                <a:gd name="connsiteX0" fmla="*/ 432909 w 1389590"/>
+                <a:gd name="connsiteY0" fmla="*/ 0 h 1969730"/>
+                <a:gd name="connsiteX1" fmla="*/ 1240204 w 1389590"/>
+                <a:gd name="connsiteY1" fmla="*/ 165384 h 1969730"/>
+                <a:gd name="connsiteX2" fmla="*/ 1378194 w 1389590"/>
+                <a:gd name="connsiteY2" fmla="*/ 248100 h 1969730"/>
+                <a:gd name="connsiteX3" fmla="*/ 1378194 w 1389590"/>
+                <a:gd name="connsiteY3" fmla="*/ 254482 h 1969730"/>
+                <a:gd name="connsiteX4" fmla="*/ 1389590 w 1389590"/>
+                <a:gd name="connsiteY4" fmla="*/ 254482 h 1969730"/>
+                <a:gd name="connsiteX5" fmla="*/ 1389590 w 1389590"/>
+                <a:gd name="connsiteY5" fmla="*/ 1969730 h 1969730"/>
+                <a:gd name="connsiteX6" fmla="*/ 1389362 w 1389590"/>
+                <a:gd name="connsiteY6" fmla="*/ 1969730 h 1969730"/>
+                <a:gd name="connsiteX7" fmla="*/ 1328395 w 1389590"/>
+                <a:gd name="connsiteY7" fmla="*/ 1929407 h 1969730"/>
+                <a:gd name="connsiteX8" fmla="*/ 447414 w 1389590"/>
+                <a:gd name="connsiteY8" fmla="*/ 1723925 h 1969730"/>
+                <a:gd name="connsiteX9" fmla="*/ 3018 w 1389590"/>
+                <a:gd name="connsiteY9" fmla="*/ 1768299 h 1969730"/>
+                <a:gd name="connsiteX10" fmla="*/ 0 w 1389590"/>
+                <a:gd name="connsiteY10" fmla="*/ 1769109 h 1969730"/>
+                <a:gd name="connsiteX11" fmla="*/ 0 w 1389590"/>
+                <a:gd name="connsiteY11" fmla="*/ 254482 h 1969730"/>
+                <a:gd name="connsiteX12" fmla="*/ 2355 w 1389590"/>
+                <a:gd name="connsiteY12" fmla="*/ 254482 h 1969730"/>
+                <a:gd name="connsiteX13" fmla="*/ 2355 w 1389590"/>
+                <a:gd name="connsiteY13" fmla="*/ 42248 h 1969730"/>
+                <a:gd name="connsiteX14" fmla="*/ 202820 w 1389590"/>
+                <a:gd name="connsiteY14" fmla="*/ 11472 h 1969730"/>
+                <a:gd name="connsiteX15" fmla="*/ 432909 w 1389590"/>
+                <a:gd name="connsiteY15" fmla="*/ 0 h 1969730"/>
+              </a:gdLst>
+              <a:ahLst/>
+              <a:cxnLst>
+                <a:cxn ang="0">
+                  <a:pos x="connsiteX0" y="connsiteY0"/>
+                </a:cxn>
+                <a:cxn ang="0">
+                  <a:pos x="connsiteX1" y="connsiteY1"/>
+                </a:cxn>
+                <a:cxn ang="0">
+                  <a:pos x="connsiteX2" y="connsiteY2"/>
+                </a:cxn>
+                <a:cxn ang="0">
+                  <a:pos x="connsiteX3" y="connsiteY3"/>
+                </a:cxn>
+                <a:cxn ang="0">
+                  <a:pos x="connsiteX4" y="connsiteY4"/>
+                </a:cxn>
+                <a:cxn ang="0">
+                  <a:pos x="connsiteX5" y="connsiteY5"/>
+                </a:cxn>
+                <a:cxn ang="0">
+                  <a:pos x="connsiteX6" y="connsiteY6"/>
+                </a:cxn>
+                <a:cxn ang="0">
+                  <a:pos x="connsiteX7" y="connsiteY7"/>
+                </a:cxn>
+                <a:cxn ang="0">
+                  <a:pos x="connsiteX8" y="connsiteY8"/>
+                </a:cxn>
+                <a:cxn ang="0">
+                  <a:pos x="connsiteX9" y="connsiteY9"/>
+                </a:cxn>
+                <a:cxn ang="0">
+                  <a:pos x="connsiteX10" y="connsiteY10"/>
+                </a:cxn>
+                <a:cxn ang="0">
+                  <a:pos x="connsiteX11" y="connsiteY11"/>
+                </a:cxn>
+                <a:cxn ang="0">
+                  <a:pos x="connsiteX12" y="connsiteY12"/>
+                </a:cxn>
+                <a:cxn ang="0">
+                  <a:pos x="connsiteX13" y="connsiteY13"/>
+                </a:cxn>
+                <a:cxn ang="0">
+                  <a:pos x="connsiteX14" y="connsiteY14"/>
+                </a:cxn>
+                <a:cxn ang="0">
+                  <a:pos x="connsiteX15" y="connsiteY15"/>
+                </a:cxn>
+              </a:cxnLst>
+              <a:rect l="l" t="t" r="r" b="b"/>
+              <a:pathLst>
+                <a:path w="1389590" h="1969730">
+                  <a:moveTo>
+                    <a:pt x="432909" y="0"/>
+                  </a:moveTo>
+                  <a:cubicBezTo>
+                    <a:pt x="748177" y="0"/>
+                    <a:pt x="1033599" y="63201"/>
+                    <a:pt x="1240204" y="165384"/>
+                  </a:cubicBezTo>
+                  <a:lnTo>
+                    <a:pt x="1378194" y="248100"/>
+                  </a:lnTo>
+                  <a:lnTo>
+                    <a:pt x="1378194" y="254482"/>
+                  </a:lnTo>
+                  <a:lnTo>
+                    <a:pt x="1389590" y="254482"/>
+                  </a:lnTo>
+                  <a:lnTo>
+                    <a:pt x="1389590" y="1969730"/>
+                  </a:lnTo>
+                  <a:lnTo>
+                    <a:pt x="1389362" y="1969730"/>
+                  </a:lnTo>
+                  <a:lnTo>
+                    <a:pt x="1328395" y="1929407"/>
+                  </a:lnTo>
+                  <a:cubicBezTo>
+                    <a:pt x="1118993" y="1803914"/>
+                    <a:pt x="802091" y="1723925"/>
+                    <a:pt x="447414" y="1723925"/>
+                  </a:cubicBezTo>
+                  <a:cubicBezTo>
+                    <a:pt x="289780" y="1723925"/>
+                    <a:pt x="139608" y="1739725"/>
+                    <a:pt x="3018" y="1768299"/>
+                  </a:cubicBezTo>
+                  <a:lnTo>
+                    <a:pt x="0" y="1769109"/>
+                  </a:lnTo>
+                  <a:lnTo>
+                    <a:pt x="0" y="254482"/>
+                  </a:lnTo>
+                  <a:lnTo>
+                    <a:pt x="2355" y="254482"/>
+                  </a:lnTo>
+                  <a:lnTo>
+                    <a:pt x="2355" y="42248"/>
+                  </a:lnTo>
+                  <a:lnTo>
+                    <a:pt x="202820" y="11472"/>
+                  </a:lnTo>
+                  <a:cubicBezTo>
+                    <a:pt x="277141" y="3950"/>
+                    <a:pt x="354092" y="0"/>
+                    <a:pt x="432909" y="0"/>
+                  </a:cubicBezTo>
+                  <a:close/>
+                </a:path>
+              </a:pathLst>
+            </a:custGeom>
+            <a:grpFill/>
             <a:ln>
               <a:noFill/>
             </a:ln>
@@ -7139,78 +6896,50 @@
         </p:sp>
         <p:sp>
           <p:nvSpPr>
-            <p:cNvPr id="196" name="Freeform: Shape 195"/>
+            <p:cNvPr id="71" name="Freeform: Shape 70"/>
             <p:cNvSpPr/>
             <p:nvPr/>
           </p:nvSpPr>
           <p:spPr>
-            <a:xfrm>
-              <a:off x="2722759" y="4478055"/>
-              <a:ext cx="1671393" cy="1194859"/>
+            <a:xfrm flipH="1">
+              <a:off x="3556279" y="4524538"/>
+              <a:ext cx="945528" cy="1340277"/>
             </a:xfrm>
             <a:custGeom>
               <a:avLst/>
               <a:gdLst>
-                <a:gd name="connsiteX0" fmla="*/ 294567 w 1884882"/>
-                <a:gd name="connsiteY0" fmla="*/ 0 h 1347480"/>
-                <a:gd name="connsiteX1" fmla="*/ 843880 w 1884882"/>
-                <a:gd name="connsiteY1" fmla="*/ 112534 h 1347480"/>
-                <a:gd name="connsiteX2" fmla="*/ 937774 w 1884882"/>
-                <a:gd name="connsiteY2" fmla="*/ 168817 h 1347480"/>
-                <a:gd name="connsiteX3" fmla="*/ 937774 w 1884882"/>
-                <a:gd name="connsiteY3" fmla="*/ 173159 h 1347480"/>
-                <a:gd name="connsiteX4" fmla="*/ 945528 w 1884882"/>
-                <a:gd name="connsiteY4" fmla="*/ 173159 h 1347480"/>
-                <a:gd name="connsiteX5" fmla="*/ 945528 w 1884882"/>
-                <a:gd name="connsiteY5" fmla="*/ 180362 h 1347480"/>
-                <a:gd name="connsiteX6" fmla="*/ 947108 w 1884882"/>
-                <a:gd name="connsiteY6" fmla="*/ 180362 h 1347480"/>
-                <a:gd name="connsiteX7" fmla="*/ 947108 w 1884882"/>
-                <a:gd name="connsiteY7" fmla="*/ 176020 h 1347480"/>
-                <a:gd name="connsiteX8" fmla="*/ 1041002 w 1884882"/>
-                <a:gd name="connsiteY8" fmla="*/ 119737 h 1347480"/>
-                <a:gd name="connsiteX9" fmla="*/ 1590315 w 1884882"/>
-                <a:gd name="connsiteY9" fmla="*/ 7203 h 1347480"/>
-                <a:gd name="connsiteX10" fmla="*/ 1746876 w 1884882"/>
-                <a:gd name="connsiteY10" fmla="*/ 15009 h 1347480"/>
-                <a:gd name="connsiteX11" fmla="*/ 1883280 w 1884882"/>
-                <a:gd name="connsiteY11" fmla="*/ 35950 h 1347480"/>
-                <a:gd name="connsiteX12" fmla="*/ 1883280 w 1884882"/>
-                <a:gd name="connsiteY12" fmla="*/ 180362 h 1347480"/>
-                <a:gd name="connsiteX13" fmla="*/ 1884882 w 1884882"/>
-                <a:gd name="connsiteY13" fmla="*/ 180362 h 1347480"/>
-                <a:gd name="connsiteX14" fmla="*/ 1884882 w 1884882"/>
-                <a:gd name="connsiteY14" fmla="*/ 1210970 h 1347480"/>
-                <a:gd name="connsiteX15" fmla="*/ 1882829 w 1884882"/>
-                <a:gd name="connsiteY15" fmla="*/ 1210419 h 1347480"/>
-                <a:gd name="connsiteX16" fmla="*/ 1580445 w 1884882"/>
-                <a:gd name="connsiteY16" fmla="*/ 1180225 h 1347480"/>
-                <a:gd name="connsiteX17" fmla="*/ 980993 w 1884882"/>
-                <a:gd name="connsiteY17" fmla="*/ 1320043 h 1347480"/>
-                <a:gd name="connsiteX18" fmla="*/ 939509 w 1884882"/>
-                <a:gd name="connsiteY18" fmla="*/ 1347480 h 1347480"/>
-                <a:gd name="connsiteX19" fmla="*/ 939354 w 1884882"/>
-                <a:gd name="connsiteY19" fmla="*/ 1347480 h 1347480"/>
-                <a:gd name="connsiteX20" fmla="*/ 939354 w 1884882"/>
-                <a:gd name="connsiteY20" fmla="*/ 1336296 h 1347480"/>
-                <a:gd name="connsiteX21" fmla="*/ 903889 w 1884882"/>
-                <a:gd name="connsiteY21" fmla="*/ 1312840 h 1347480"/>
-                <a:gd name="connsiteX22" fmla="*/ 304437 w 1884882"/>
-                <a:gd name="connsiteY22" fmla="*/ 1173022 h 1347480"/>
-                <a:gd name="connsiteX23" fmla="*/ 2054 w 1884882"/>
-                <a:gd name="connsiteY23" fmla="*/ 1203216 h 1347480"/>
-                <a:gd name="connsiteX24" fmla="*/ 0 w 1884882"/>
-                <a:gd name="connsiteY24" fmla="*/ 1203767 h 1347480"/>
-                <a:gd name="connsiteX25" fmla="*/ 0 w 1884882"/>
-                <a:gd name="connsiteY25" fmla="*/ 173159 h 1347480"/>
-                <a:gd name="connsiteX26" fmla="*/ 1603 w 1884882"/>
-                <a:gd name="connsiteY26" fmla="*/ 173159 h 1347480"/>
-                <a:gd name="connsiteX27" fmla="*/ 1603 w 1884882"/>
-                <a:gd name="connsiteY27" fmla="*/ 28747 h 1347480"/>
-                <a:gd name="connsiteX28" fmla="*/ 138006 w 1884882"/>
-                <a:gd name="connsiteY28" fmla="*/ 7806 h 1347480"/>
-                <a:gd name="connsiteX29" fmla="*/ 294567 w 1884882"/>
-                <a:gd name="connsiteY29" fmla="*/ 0 h 1347480"/>
+                <a:gd name="connsiteX0" fmla="*/ 432909 w 1389590"/>
+                <a:gd name="connsiteY0" fmla="*/ 0 h 1969730"/>
+                <a:gd name="connsiteX1" fmla="*/ 1240204 w 1389590"/>
+                <a:gd name="connsiteY1" fmla="*/ 165384 h 1969730"/>
+                <a:gd name="connsiteX2" fmla="*/ 1378194 w 1389590"/>
+                <a:gd name="connsiteY2" fmla="*/ 248100 h 1969730"/>
+                <a:gd name="connsiteX3" fmla="*/ 1378194 w 1389590"/>
+                <a:gd name="connsiteY3" fmla="*/ 254482 h 1969730"/>
+                <a:gd name="connsiteX4" fmla="*/ 1389590 w 1389590"/>
+                <a:gd name="connsiteY4" fmla="*/ 254482 h 1969730"/>
+                <a:gd name="connsiteX5" fmla="*/ 1389590 w 1389590"/>
+                <a:gd name="connsiteY5" fmla="*/ 1969730 h 1969730"/>
+                <a:gd name="connsiteX6" fmla="*/ 1389362 w 1389590"/>
+                <a:gd name="connsiteY6" fmla="*/ 1969730 h 1969730"/>
+                <a:gd name="connsiteX7" fmla="*/ 1328395 w 1389590"/>
+                <a:gd name="connsiteY7" fmla="*/ 1929407 h 1969730"/>
+                <a:gd name="connsiteX8" fmla="*/ 447414 w 1389590"/>
+                <a:gd name="connsiteY8" fmla="*/ 1723925 h 1969730"/>
+                <a:gd name="connsiteX9" fmla="*/ 3018 w 1389590"/>
+                <a:gd name="connsiteY9" fmla="*/ 1768299 h 1969730"/>
+                <a:gd name="connsiteX10" fmla="*/ 0 w 1389590"/>
+                <a:gd name="connsiteY10" fmla="*/ 1769109 h 1969730"/>
+                <a:gd name="connsiteX11" fmla="*/ 0 w 1389590"/>
+                <a:gd name="connsiteY11" fmla="*/ 254482 h 1969730"/>
+                <a:gd name="connsiteX12" fmla="*/ 2355 w 1389590"/>
+                <a:gd name="connsiteY12" fmla="*/ 254482 h 1969730"/>
+                <a:gd name="connsiteX13" fmla="*/ 2355 w 1389590"/>
+                <a:gd name="connsiteY13" fmla="*/ 42248 h 1969730"/>
+                <a:gd name="connsiteX14" fmla="*/ 202820 w 1389590"/>
+                <a:gd name="connsiteY14" fmla="*/ 11472 h 1969730"/>
+                <a:gd name="connsiteX15" fmla="*/ 432909 w 1389590"/>
+                <a:gd name="connsiteY15" fmla="*/ 0 h 1969730"/>
               </a:gdLst>
               <a:ahLst/>
               <a:cxnLst>
@@ -7262,165 +6991,71 @@
                 <a:cxn ang="0">
                   <a:pos x="connsiteX15" y="connsiteY15"/>
                 </a:cxn>
-                <a:cxn ang="0">
-                  <a:pos x="connsiteX16" y="connsiteY16"/>
-                </a:cxn>
-                <a:cxn ang="0">
-                  <a:pos x="connsiteX17" y="connsiteY17"/>
-                </a:cxn>
-                <a:cxn ang="0">
-                  <a:pos x="connsiteX18" y="connsiteY18"/>
-                </a:cxn>
-                <a:cxn ang="0">
-                  <a:pos x="connsiteX19" y="connsiteY19"/>
-                </a:cxn>
-                <a:cxn ang="0">
-                  <a:pos x="connsiteX20" y="connsiteY20"/>
-                </a:cxn>
-                <a:cxn ang="0">
-                  <a:pos x="connsiteX21" y="connsiteY21"/>
-                </a:cxn>
-                <a:cxn ang="0">
-                  <a:pos x="connsiteX22" y="connsiteY22"/>
-                </a:cxn>
-                <a:cxn ang="0">
-                  <a:pos x="connsiteX23" y="connsiteY23"/>
-                </a:cxn>
-                <a:cxn ang="0">
-                  <a:pos x="connsiteX24" y="connsiteY24"/>
-                </a:cxn>
-                <a:cxn ang="0">
-                  <a:pos x="connsiteX25" y="connsiteY25"/>
-                </a:cxn>
-                <a:cxn ang="0">
-                  <a:pos x="connsiteX26" y="connsiteY26"/>
-                </a:cxn>
-                <a:cxn ang="0">
-                  <a:pos x="connsiteX27" y="connsiteY27"/>
-                </a:cxn>
-                <a:cxn ang="0">
-                  <a:pos x="connsiteX28" y="connsiteY28"/>
-                </a:cxn>
-                <a:cxn ang="0">
-                  <a:pos x="connsiteX29" y="connsiteY29"/>
-                </a:cxn>
               </a:cxnLst>
               <a:rect l="l" t="t" r="r" b="b"/>
               <a:pathLst>
-                <a:path w="1884882" h="1347480">
+                <a:path w="1389590" h="1969730">
                   <a:moveTo>
-                    <a:pt x="294567" y="0"/>
+                    <a:pt x="432909" y="0"/>
                   </a:moveTo>
                   <a:cubicBezTo>
-                    <a:pt x="509087" y="0"/>
-                    <a:pt x="703299" y="43005"/>
-                    <a:pt x="843880" y="112534"/>
+                    <a:pt x="748177" y="0"/>
+                    <a:pt x="1033599" y="63201"/>
+                    <a:pt x="1240204" y="165384"/>
                   </a:cubicBezTo>
                   <a:lnTo>
-                    <a:pt x="937774" y="168817"/>
-                  </a:lnTo>
-                  <a:lnTo>
-                    <a:pt x="937774" y="173159"/>
-                  </a:lnTo>
-                  <a:lnTo>
-                    <a:pt x="945528" y="173159"/>
-                  </a:lnTo>
-                  <a:lnTo>
-                    <a:pt x="945528" y="180362"/>
-                  </a:lnTo>
-                  <a:lnTo>
-                    <a:pt x="947108" y="180362"/>
-                  </a:lnTo>
-                  <a:lnTo>
-                    <a:pt x="947108" y="176020"/>
-                  </a:lnTo>
-                  <a:lnTo>
-                    <a:pt x="1041002" y="119737"/>
+                    <a:pt x="1378194" y="248100"/>
+                  </a:lnTo>
+                  <a:lnTo>
+                    <a:pt x="1378194" y="254482"/>
+                  </a:lnTo>
+                  <a:lnTo>
+                    <a:pt x="1389590" y="254482"/>
+                  </a:lnTo>
+                  <a:lnTo>
+                    <a:pt x="1389590" y="1969730"/>
+                  </a:lnTo>
+                  <a:lnTo>
+                    <a:pt x="1389362" y="1969730"/>
+                  </a:lnTo>
+                  <a:lnTo>
+                    <a:pt x="1328395" y="1929407"/>
                   </a:lnTo>
                   <a:cubicBezTo>
-                    <a:pt x="1181583" y="50208"/>
-                    <a:pt x="1375795" y="7203"/>
-                    <a:pt x="1590315" y="7203"/>
+                    <a:pt x="1118993" y="1803914"/>
+                    <a:pt x="802091" y="1723925"/>
+                    <a:pt x="447414" y="1723925"/>
                   </a:cubicBezTo>
                   <a:cubicBezTo>
-                    <a:pt x="1643945" y="7203"/>
-                    <a:pt x="1696305" y="9891"/>
-                    <a:pt x="1746876" y="15009"/>
+                    <a:pt x="289780" y="1723925"/>
+                    <a:pt x="139608" y="1739725"/>
+                    <a:pt x="3018" y="1768299"/>
                   </a:cubicBezTo>
                   <a:lnTo>
-                    <a:pt x="1883280" y="35950"/>
-                  </a:lnTo>
-                  <a:lnTo>
-                    <a:pt x="1883280" y="180362"/>
-                  </a:lnTo>
-                  <a:lnTo>
-                    <a:pt x="1884882" y="180362"/>
-                  </a:lnTo>
-                  <a:lnTo>
-                    <a:pt x="1884882" y="1210970"/>
-                  </a:lnTo>
-                  <a:lnTo>
-                    <a:pt x="1882829" y="1210419"/>
+                    <a:pt x="0" y="1769109"/>
+                  </a:lnTo>
+                  <a:lnTo>
+                    <a:pt x="0" y="254482"/>
+                  </a:lnTo>
+                  <a:lnTo>
+                    <a:pt x="2355" y="254482"/>
+                  </a:lnTo>
+                  <a:lnTo>
+                    <a:pt x="2355" y="42248"/>
+                  </a:lnTo>
+                  <a:lnTo>
+                    <a:pt x="202820" y="11472"/>
                   </a:lnTo>
                   <a:cubicBezTo>
-                    <a:pt x="1789888" y="1190976"/>
-                    <a:pt x="1687705" y="1180225"/>
-                    <a:pt x="1580445" y="1180225"/>
-                  </a:cubicBezTo>
-                  <a:cubicBezTo>
-                    <a:pt x="1339110" y="1180225"/>
-                    <a:pt x="1123478" y="1234653"/>
-                    <a:pt x="980993" y="1320043"/>
-                  </a:cubicBezTo>
-                  <a:lnTo>
-                    <a:pt x="939509" y="1347480"/>
-                  </a:lnTo>
-                  <a:lnTo>
-                    <a:pt x="939354" y="1347480"/>
-                  </a:lnTo>
-                  <a:lnTo>
-                    <a:pt x="939354" y="1336296"/>
-                  </a:lnTo>
-                  <a:lnTo>
-                    <a:pt x="903889" y="1312840"/>
-                  </a:lnTo>
-                  <a:cubicBezTo>
-                    <a:pt x="761404" y="1227450"/>
-                    <a:pt x="545772" y="1173022"/>
-                    <a:pt x="304437" y="1173022"/>
-                  </a:cubicBezTo>
-                  <a:cubicBezTo>
-                    <a:pt x="197177" y="1173022"/>
-                    <a:pt x="94995" y="1183773"/>
-                    <a:pt x="2054" y="1203216"/>
-                  </a:cubicBezTo>
-                  <a:lnTo>
-                    <a:pt x="0" y="1203767"/>
-                  </a:lnTo>
-                  <a:lnTo>
-                    <a:pt x="0" y="173159"/>
-                  </a:lnTo>
-                  <a:lnTo>
-                    <a:pt x="1603" y="173159"/>
-                  </a:lnTo>
-                  <a:lnTo>
-                    <a:pt x="1603" y="28747"/>
-                  </a:lnTo>
-                  <a:lnTo>
-                    <a:pt x="138006" y="7806"/>
-                  </a:lnTo>
-                  <a:cubicBezTo>
-                    <a:pt x="188577" y="2688"/>
-                    <a:pt x="240937" y="0"/>
-                    <a:pt x="294567" y="0"/>
+                    <a:pt x="277141" y="3950"/>
+                    <a:pt x="354092" y="0"/>
+                    <a:pt x="432909" y="0"/>
                   </a:cubicBezTo>
                   <a:close/>
                 </a:path>
               </a:pathLst>
             </a:custGeom>
-            <a:solidFill>
-              <a:srgbClr val="F79646"/>
-            </a:solidFill>
+            <a:grpFill/>
             <a:ln>
               <a:noFill/>
             </a:ln>
@@ -7451,6 +7086,1593 @@
           </p:txBody>
         </p:sp>
       </p:grpSp>
+      <p:grpSp>
+        <p:nvGrpSpPr>
+          <p:cNvPr id="99" name="Group 98"/>
+          <p:cNvGrpSpPr/>
+          <p:nvPr/>
+        </p:nvGrpSpPr>
+        <p:grpSpPr>
+          <a:xfrm>
+            <a:off x="687784" y="3598653"/>
+            <a:ext cx="357768" cy="255032"/>
+            <a:chOff x="2616925" y="4524538"/>
+            <a:chExt cx="1884882" cy="1341314"/>
+          </a:xfrm>
+          <a:solidFill>
+            <a:srgbClr val="0070C0"/>
+          </a:solidFill>
+        </p:grpSpPr>
+        <p:sp>
+          <p:nvSpPr>
+            <p:cNvPr id="103" name="Freeform: Shape 102"/>
+            <p:cNvSpPr/>
+            <p:nvPr/>
+          </p:nvSpPr>
+          <p:spPr>
+            <a:xfrm>
+              <a:off x="2616925" y="4525576"/>
+              <a:ext cx="945527" cy="1340276"/>
+            </a:xfrm>
+            <a:custGeom>
+              <a:avLst/>
+              <a:gdLst>
+                <a:gd name="connsiteX0" fmla="*/ 432909 w 1389590"/>
+                <a:gd name="connsiteY0" fmla="*/ 0 h 1969730"/>
+                <a:gd name="connsiteX1" fmla="*/ 1240204 w 1389590"/>
+                <a:gd name="connsiteY1" fmla="*/ 165384 h 1969730"/>
+                <a:gd name="connsiteX2" fmla="*/ 1378194 w 1389590"/>
+                <a:gd name="connsiteY2" fmla="*/ 248100 h 1969730"/>
+                <a:gd name="connsiteX3" fmla="*/ 1378194 w 1389590"/>
+                <a:gd name="connsiteY3" fmla="*/ 254482 h 1969730"/>
+                <a:gd name="connsiteX4" fmla="*/ 1389590 w 1389590"/>
+                <a:gd name="connsiteY4" fmla="*/ 254482 h 1969730"/>
+                <a:gd name="connsiteX5" fmla="*/ 1389590 w 1389590"/>
+                <a:gd name="connsiteY5" fmla="*/ 1969730 h 1969730"/>
+                <a:gd name="connsiteX6" fmla="*/ 1389362 w 1389590"/>
+                <a:gd name="connsiteY6" fmla="*/ 1969730 h 1969730"/>
+                <a:gd name="connsiteX7" fmla="*/ 1328395 w 1389590"/>
+                <a:gd name="connsiteY7" fmla="*/ 1929407 h 1969730"/>
+                <a:gd name="connsiteX8" fmla="*/ 447414 w 1389590"/>
+                <a:gd name="connsiteY8" fmla="*/ 1723925 h 1969730"/>
+                <a:gd name="connsiteX9" fmla="*/ 3018 w 1389590"/>
+                <a:gd name="connsiteY9" fmla="*/ 1768299 h 1969730"/>
+                <a:gd name="connsiteX10" fmla="*/ 0 w 1389590"/>
+                <a:gd name="connsiteY10" fmla="*/ 1769109 h 1969730"/>
+                <a:gd name="connsiteX11" fmla="*/ 0 w 1389590"/>
+                <a:gd name="connsiteY11" fmla="*/ 254482 h 1969730"/>
+                <a:gd name="connsiteX12" fmla="*/ 2355 w 1389590"/>
+                <a:gd name="connsiteY12" fmla="*/ 254482 h 1969730"/>
+                <a:gd name="connsiteX13" fmla="*/ 2355 w 1389590"/>
+                <a:gd name="connsiteY13" fmla="*/ 42248 h 1969730"/>
+                <a:gd name="connsiteX14" fmla="*/ 202820 w 1389590"/>
+                <a:gd name="connsiteY14" fmla="*/ 11472 h 1969730"/>
+                <a:gd name="connsiteX15" fmla="*/ 432909 w 1389590"/>
+                <a:gd name="connsiteY15" fmla="*/ 0 h 1969730"/>
+              </a:gdLst>
+              <a:ahLst/>
+              <a:cxnLst>
+                <a:cxn ang="0">
+                  <a:pos x="connsiteX0" y="connsiteY0"/>
+                </a:cxn>
+                <a:cxn ang="0">
+                  <a:pos x="connsiteX1" y="connsiteY1"/>
+                </a:cxn>
+                <a:cxn ang="0">
+                  <a:pos x="connsiteX2" y="connsiteY2"/>
+                </a:cxn>
+                <a:cxn ang="0">
+                  <a:pos x="connsiteX3" y="connsiteY3"/>
+                </a:cxn>
+                <a:cxn ang="0">
+                  <a:pos x="connsiteX4" y="connsiteY4"/>
+                </a:cxn>
+                <a:cxn ang="0">
+                  <a:pos x="connsiteX5" y="connsiteY5"/>
+                </a:cxn>
+                <a:cxn ang="0">
+                  <a:pos x="connsiteX6" y="connsiteY6"/>
+                </a:cxn>
+                <a:cxn ang="0">
+                  <a:pos x="connsiteX7" y="connsiteY7"/>
+                </a:cxn>
+                <a:cxn ang="0">
+                  <a:pos x="connsiteX8" y="connsiteY8"/>
+                </a:cxn>
+                <a:cxn ang="0">
+                  <a:pos x="connsiteX9" y="connsiteY9"/>
+                </a:cxn>
+                <a:cxn ang="0">
+                  <a:pos x="connsiteX10" y="connsiteY10"/>
+                </a:cxn>
+                <a:cxn ang="0">
+                  <a:pos x="connsiteX11" y="connsiteY11"/>
+                </a:cxn>
+                <a:cxn ang="0">
+                  <a:pos x="connsiteX12" y="connsiteY12"/>
+                </a:cxn>
+                <a:cxn ang="0">
+                  <a:pos x="connsiteX13" y="connsiteY13"/>
+                </a:cxn>
+                <a:cxn ang="0">
+                  <a:pos x="connsiteX14" y="connsiteY14"/>
+                </a:cxn>
+                <a:cxn ang="0">
+                  <a:pos x="connsiteX15" y="connsiteY15"/>
+                </a:cxn>
+              </a:cxnLst>
+              <a:rect l="l" t="t" r="r" b="b"/>
+              <a:pathLst>
+                <a:path w="1389590" h="1969730">
+                  <a:moveTo>
+                    <a:pt x="432909" y="0"/>
+                  </a:moveTo>
+                  <a:cubicBezTo>
+                    <a:pt x="748177" y="0"/>
+                    <a:pt x="1033599" y="63201"/>
+                    <a:pt x="1240204" y="165384"/>
+                  </a:cubicBezTo>
+                  <a:lnTo>
+                    <a:pt x="1378194" y="248100"/>
+                  </a:lnTo>
+                  <a:lnTo>
+                    <a:pt x="1378194" y="254482"/>
+                  </a:lnTo>
+                  <a:lnTo>
+                    <a:pt x="1389590" y="254482"/>
+                  </a:lnTo>
+                  <a:lnTo>
+                    <a:pt x="1389590" y="1969730"/>
+                  </a:lnTo>
+                  <a:lnTo>
+                    <a:pt x="1389362" y="1969730"/>
+                  </a:lnTo>
+                  <a:lnTo>
+                    <a:pt x="1328395" y="1929407"/>
+                  </a:lnTo>
+                  <a:cubicBezTo>
+                    <a:pt x="1118993" y="1803914"/>
+                    <a:pt x="802091" y="1723925"/>
+                    <a:pt x="447414" y="1723925"/>
+                  </a:cubicBezTo>
+                  <a:cubicBezTo>
+                    <a:pt x="289780" y="1723925"/>
+                    <a:pt x="139608" y="1739725"/>
+                    <a:pt x="3018" y="1768299"/>
+                  </a:cubicBezTo>
+                  <a:lnTo>
+                    <a:pt x="0" y="1769109"/>
+                  </a:lnTo>
+                  <a:lnTo>
+                    <a:pt x="0" y="254482"/>
+                  </a:lnTo>
+                  <a:lnTo>
+                    <a:pt x="2355" y="254482"/>
+                  </a:lnTo>
+                  <a:lnTo>
+                    <a:pt x="2355" y="42248"/>
+                  </a:lnTo>
+                  <a:lnTo>
+                    <a:pt x="202820" y="11472"/>
+                  </a:lnTo>
+                  <a:cubicBezTo>
+                    <a:pt x="277141" y="3950"/>
+                    <a:pt x="354092" y="0"/>
+                    <a:pt x="432909" y="0"/>
+                  </a:cubicBezTo>
+                  <a:close/>
+                </a:path>
+              </a:pathLst>
+            </a:custGeom>
+            <a:grpFill/>
+            <a:ln>
+              <a:noFill/>
+            </a:ln>
+          </p:spPr>
+          <p:style>
+            <a:lnRef idx="2">
+              <a:schemeClr val="accent1">
+                <a:shade val="50000"/>
+              </a:schemeClr>
+            </a:lnRef>
+            <a:fillRef idx="1">
+              <a:schemeClr val="accent1"/>
+            </a:fillRef>
+            <a:effectRef idx="0">
+              <a:schemeClr val="accent1"/>
+            </a:effectRef>
+            <a:fontRef idx="minor">
+              <a:schemeClr val="lt1"/>
+            </a:fontRef>
+          </p:style>
+          <p:txBody>
+            <a:bodyPr rtlCol="0" anchor="ctr"/>
+            <a:lstStyle/>
+            <a:p>
+              <a:pPr algn="ctr"/>
+              <a:endParaRPr lang="en-US"/>
+            </a:p>
+          </p:txBody>
+        </p:sp>
+        <p:sp>
+          <p:nvSpPr>
+            <p:cNvPr id="105" name="Freeform: Shape 104"/>
+            <p:cNvSpPr/>
+            <p:nvPr/>
+          </p:nvSpPr>
+          <p:spPr>
+            <a:xfrm flipH="1">
+              <a:off x="3556279" y="4524538"/>
+              <a:ext cx="945528" cy="1340277"/>
+            </a:xfrm>
+            <a:custGeom>
+              <a:avLst/>
+              <a:gdLst>
+                <a:gd name="connsiteX0" fmla="*/ 432909 w 1389590"/>
+                <a:gd name="connsiteY0" fmla="*/ 0 h 1969730"/>
+                <a:gd name="connsiteX1" fmla="*/ 1240204 w 1389590"/>
+                <a:gd name="connsiteY1" fmla="*/ 165384 h 1969730"/>
+                <a:gd name="connsiteX2" fmla="*/ 1378194 w 1389590"/>
+                <a:gd name="connsiteY2" fmla="*/ 248100 h 1969730"/>
+                <a:gd name="connsiteX3" fmla="*/ 1378194 w 1389590"/>
+                <a:gd name="connsiteY3" fmla="*/ 254482 h 1969730"/>
+                <a:gd name="connsiteX4" fmla="*/ 1389590 w 1389590"/>
+                <a:gd name="connsiteY4" fmla="*/ 254482 h 1969730"/>
+                <a:gd name="connsiteX5" fmla="*/ 1389590 w 1389590"/>
+                <a:gd name="connsiteY5" fmla="*/ 1969730 h 1969730"/>
+                <a:gd name="connsiteX6" fmla="*/ 1389362 w 1389590"/>
+                <a:gd name="connsiteY6" fmla="*/ 1969730 h 1969730"/>
+                <a:gd name="connsiteX7" fmla="*/ 1328395 w 1389590"/>
+                <a:gd name="connsiteY7" fmla="*/ 1929407 h 1969730"/>
+                <a:gd name="connsiteX8" fmla="*/ 447414 w 1389590"/>
+                <a:gd name="connsiteY8" fmla="*/ 1723925 h 1969730"/>
+                <a:gd name="connsiteX9" fmla="*/ 3018 w 1389590"/>
+                <a:gd name="connsiteY9" fmla="*/ 1768299 h 1969730"/>
+                <a:gd name="connsiteX10" fmla="*/ 0 w 1389590"/>
+                <a:gd name="connsiteY10" fmla="*/ 1769109 h 1969730"/>
+                <a:gd name="connsiteX11" fmla="*/ 0 w 1389590"/>
+                <a:gd name="connsiteY11" fmla="*/ 254482 h 1969730"/>
+                <a:gd name="connsiteX12" fmla="*/ 2355 w 1389590"/>
+                <a:gd name="connsiteY12" fmla="*/ 254482 h 1969730"/>
+                <a:gd name="connsiteX13" fmla="*/ 2355 w 1389590"/>
+                <a:gd name="connsiteY13" fmla="*/ 42248 h 1969730"/>
+                <a:gd name="connsiteX14" fmla="*/ 202820 w 1389590"/>
+                <a:gd name="connsiteY14" fmla="*/ 11472 h 1969730"/>
+                <a:gd name="connsiteX15" fmla="*/ 432909 w 1389590"/>
+                <a:gd name="connsiteY15" fmla="*/ 0 h 1969730"/>
+              </a:gdLst>
+              <a:ahLst/>
+              <a:cxnLst>
+                <a:cxn ang="0">
+                  <a:pos x="connsiteX0" y="connsiteY0"/>
+                </a:cxn>
+                <a:cxn ang="0">
+                  <a:pos x="connsiteX1" y="connsiteY1"/>
+                </a:cxn>
+                <a:cxn ang="0">
+                  <a:pos x="connsiteX2" y="connsiteY2"/>
+                </a:cxn>
+                <a:cxn ang="0">
+                  <a:pos x="connsiteX3" y="connsiteY3"/>
+                </a:cxn>
+                <a:cxn ang="0">
+                  <a:pos x="connsiteX4" y="connsiteY4"/>
+                </a:cxn>
+                <a:cxn ang="0">
+                  <a:pos x="connsiteX5" y="connsiteY5"/>
+                </a:cxn>
+                <a:cxn ang="0">
+                  <a:pos x="connsiteX6" y="connsiteY6"/>
+                </a:cxn>
+                <a:cxn ang="0">
+                  <a:pos x="connsiteX7" y="connsiteY7"/>
+                </a:cxn>
+                <a:cxn ang="0">
+                  <a:pos x="connsiteX8" y="connsiteY8"/>
+                </a:cxn>
+                <a:cxn ang="0">
+                  <a:pos x="connsiteX9" y="connsiteY9"/>
+                </a:cxn>
+                <a:cxn ang="0">
+                  <a:pos x="connsiteX10" y="connsiteY10"/>
+                </a:cxn>
+                <a:cxn ang="0">
+                  <a:pos x="connsiteX11" y="connsiteY11"/>
+                </a:cxn>
+                <a:cxn ang="0">
+                  <a:pos x="connsiteX12" y="connsiteY12"/>
+                </a:cxn>
+                <a:cxn ang="0">
+                  <a:pos x="connsiteX13" y="connsiteY13"/>
+                </a:cxn>
+                <a:cxn ang="0">
+                  <a:pos x="connsiteX14" y="connsiteY14"/>
+                </a:cxn>
+                <a:cxn ang="0">
+                  <a:pos x="connsiteX15" y="connsiteY15"/>
+                </a:cxn>
+              </a:cxnLst>
+              <a:rect l="l" t="t" r="r" b="b"/>
+              <a:pathLst>
+                <a:path w="1389590" h="1969730">
+                  <a:moveTo>
+                    <a:pt x="432909" y="0"/>
+                  </a:moveTo>
+                  <a:cubicBezTo>
+                    <a:pt x="748177" y="0"/>
+                    <a:pt x="1033599" y="63201"/>
+                    <a:pt x="1240204" y="165384"/>
+                  </a:cubicBezTo>
+                  <a:lnTo>
+                    <a:pt x="1378194" y="248100"/>
+                  </a:lnTo>
+                  <a:lnTo>
+                    <a:pt x="1378194" y="254482"/>
+                  </a:lnTo>
+                  <a:lnTo>
+                    <a:pt x="1389590" y="254482"/>
+                  </a:lnTo>
+                  <a:lnTo>
+                    <a:pt x="1389590" y="1969730"/>
+                  </a:lnTo>
+                  <a:lnTo>
+                    <a:pt x="1389362" y="1969730"/>
+                  </a:lnTo>
+                  <a:lnTo>
+                    <a:pt x="1328395" y="1929407"/>
+                  </a:lnTo>
+                  <a:cubicBezTo>
+                    <a:pt x="1118993" y="1803914"/>
+                    <a:pt x="802091" y="1723925"/>
+                    <a:pt x="447414" y="1723925"/>
+                  </a:cubicBezTo>
+                  <a:cubicBezTo>
+                    <a:pt x="289780" y="1723925"/>
+                    <a:pt x="139608" y="1739725"/>
+                    <a:pt x="3018" y="1768299"/>
+                  </a:cubicBezTo>
+                  <a:lnTo>
+                    <a:pt x="0" y="1769109"/>
+                  </a:lnTo>
+                  <a:lnTo>
+                    <a:pt x="0" y="254482"/>
+                  </a:lnTo>
+                  <a:lnTo>
+                    <a:pt x="2355" y="254482"/>
+                  </a:lnTo>
+                  <a:lnTo>
+                    <a:pt x="2355" y="42248"/>
+                  </a:lnTo>
+                  <a:lnTo>
+                    <a:pt x="202820" y="11472"/>
+                  </a:lnTo>
+                  <a:cubicBezTo>
+                    <a:pt x="277141" y="3950"/>
+                    <a:pt x="354092" y="0"/>
+                    <a:pt x="432909" y="0"/>
+                  </a:cubicBezTo>
+                  <a:close/>
+                </a:path>
+              </a:pathLst>
+            </a:custGeom>
+            <a:grpFill/>
+            <a:ln>
+              <a:noFill/>
+            </a:ln>
+          </p:spPr>
+          <p:style>
+            <a:lnRef idx="2">
+              <a:schemeClr val="accent1">
+                <a:shade val="50000"/>
+              </a:schemeClr>
+            </a:lnRef>
+            <a:fillRef idx="1">
+              <a:schemeClr val="accent1"/>
+            </a:fillRef>
+            <a:effectRef idx="0">
+              <a:schemeClr val="accent1"/>
+            </a:effectRef>
+            <a:fontRef idx="minor">
+              <a:schemeClr val="lt1"/>
+            </a:fontRef>
+          </p:style>
+          <p:txBody>
+            <a:bodyPr rtlCol="0" anchor="ctr"/>
+            <a:lstStyle/>
+            <a:p>
+              <a:pPr algn="ctr"/>
+              <a:endParaRPr lang="en-US"/>
+            </a:p>
+          </p:txBody>
+        </p:sp>
+      </p:grpSp>
+      <p:grpSp>
+        <p:nvGrpSpPr>
+          <p:cNvPr id="106" name="Group 105"/>
+          <p:cNvGrpSpPr/>
+          <p:nvPr/>
+        </p:nvGrpSpPr>
+        <p:grpSpPr>
+          <a:xfrm>
+            <a:off x="687784" y="3634208"/>
+            <a:ext cx="357768" cy="255032"/>
+            <a:chOff x="2616925" y="4524538"/>
+            <a:chExt cx="1884882" cy="1341314"/>
+          </a:xfrm>
+          <a:solidFill>
+            <a:srgbClr val="0070C0"/>
+          </a:solidFill>
+        </p:grpSpPr>
+        <p:sp>
+          <p:nvSpPr>
+            <p:cNvPr id="107" name="Freeform: Shape 106"/>
+            <p:cNvSpPr/>
+            <p:nvPr/>
+          </p:nvSpPr>
+          <p:spPr>
+            <a:xfrm>
+              <a:off x="2616925" y="4525576"/>
+              <a:ext cx="945527" cy="1340276"/>
+            </a:xfrm>
+            <a:custGeom>
+              <a:avLst/>
+              <a:gdLst>
+                <a:gd name="connsiteX0" fmla="*/ 432909 w 1389590"/>
+                <a:gd name="connsiteY0" fmla="*/ 0 h 1969730"/>
+                <a:gd name="connsiteX1" fmla="*/ 1240204 w 1389590"/>
+                <a:gd name="connsiteY1" fmla="*/ 165384 h 1969730"/>
+                <a:gd name="connsiteX2" fmla="*/ 1378194 w 1389590"/>
+                <a:gd name="connsiteY2" fmla="*/ 248100 h 1969730"/>
+                <a:gd name="connsiteX3" fmla="*/ 1378194 w 1389590"/>
+                <a:gd name="connsiteY3" fmla="*/ 254482 h 1969730"/>
+                <a:gd name="connsiteX4" fmla="*/ 1389590 w 1389590"/>
+                <a:gd name="connsiteY4" fmla="*/ 254482 h 1969730"/>
+                <a:gd name="connsiteX5" fmla="*/ 1389590 w 1389590"/>
+                <a:gd name="connsiteY5" fmla="*/ 1969730 h 1969730"/>
+                <a:gd name="connsiteX6" fmla="*/ 1389362 w 1389590"/>
+                <a:gd name="connsiteY6" fmla="*/ 1969730 h 1969730"/>
+                <a:gd name="connsiteX7" fmla="*/ 1328395 w 1389590"/>
+                <a:gd name="connsiteY7" fmla="*/ 1929407 h 1969730"/>
+                <a:gd name="connsiteX8" fmla="*/ 447414 w 1389590"/>
+                <a:gd name="connsiteY8" fmla="*/ 1723925 h 1969730"/>
+                <a:gd name="connsiteX9" fmla="*/ 3018 w 1389590"/>
+                <a:gd name="connsiteY9" fmla="*/ 1768299 h 1969730"/>
+                <a:gd name="connsiteX10" fmla="*/ 0 w 1389590"/>
+                <a:gd name="connsiteY10" fmla="*/ 1769109 h 1969730"/>
+                <a:gd name="connsiteX11" fmla="*/ 0 w 1389590"/>
+                <a:gd name="connsiteY11" fmla="*/ 254482 h 1969730"/>
+                <a:gd name="connsiteX12" fmla="*/ 2355 w 1389590"/>
+                <a:gd name="connsiteY12" fmla="*/ 254482 h 1969730"/>
+                <a:gd name="connsiteX13" fmla="*/ 2355 w 1389590"/>
+                <a:gd name="connsiteY13" fmla="*/ 42248 h 1969730"/>
+                <a:gd name="connsiteX14" fmla="*/ 202820 w 1389590"/>
+                <a:gd name="connsiteY14" fmla="*/ 11472 h 1969730"/>
+                <a:gd name="connsiteX15" fmla="*/ 432909 w 1389590"/>
+                <a:gd name="connsiteY15" fmla="*/ 0 h 1969730"/>
+              </a:gdLst>
+              <a:ahLst/>
+              <a:cxnLst>
+                <a:cxn ang="0">
+                  <a:pos x="connsiteX0" y="connsiteY0"/>
+                </a:cxn>
+                <a:cxn ang="0">
+                  <a:pos x="connsiteX1" y="connsiteY1"/>
+                </a:cxn>
+                <a:cxn ang="0">
+                  <a:pos x="connsiteX2" y="connsiteY2"/>
+                </a:cxn>
+                <a:cxn ang="0">
+                  <a:pos x="connsiteX3" y="connsiteY3"/>
+                </a:cxn>
+                <a:cxn ang="0">
+                  <a:pos x="connsiteX4" y="connsiteY4"/>
+                </a:cxn>
+                <a:cxn ang="0">
+                  <a:pos x="connsiteX5" y="connsiteY5"/>
+                </a:cxn>
+                <a:cxn ang="0">
+                  <a:pos x="connsiteX6" y="connsiteY6"/>
+                </a:cxn>
+                <a:cxn ang="0">
+                  <a:pos x="connsiteX7" y="connsiteY7"/>
+                </a:cxn>
+                <a:cxn ang="0">
+                  <a:pos x="connsiteX8" y="connsiteY8"/>
+                </a:cxn>
+                <a:cxn ang="0">
+                  <a:pos x="connsiteX9" y="connsiteY9"/>
+                </a:cxn>
+                <a:cxn ang="0">
+                  <a:pos x="connsiteX10" y="connsiteY10"/>
+                </a:cxn>
+                <a:cxn ang="0">
+                  <a:pos x="connsiteX11" y="connsiteY11"/>
+                </a:cxn>
+                <a:cxn ang="0">
+                  <a:pos x="connsiteX12" y="connsiteY12"/>
+                </a:cxn>
+                <a:cxn ang="0">
+                  <a:pos x="connsiteX13" y="connsiteY13"/>
+                </a:cxn>
+                <a:cxn ang="0">
+                  <a:pos x="connsiteX14" y="connsiteY14"/>
+                </a:cxn>
+                <a:cxn ang="0">
+                  <a:pos x="connsiteX15" y="connsiteY15"/>
+                </a:cxn>
+              </a:cxnLst>
+              <a:rect l="l" t="t" r="r" b="b"/>
+              <a:pathLst>
+                <a:path w="1389590" h="1969730">
+                  <a:moveTo>
+                    <a:pt x="432909" y="0"/>
+                  </a:moveTo>
+                  <a:cubicBezTo>
+                    <a:pt x="748177" y="0"/>
+                    <a:pt x="1033599" y="63201"/>
+                    <a:pt x="1240204" y="165384"/>
+                  </a:cubicBezTo>
+                  <a:lnTo>
+                    <a:pt x="1378194" y="248100"/>
+                  </a:lnTo>
+                  <a:lnTo>
+                    <a:pt x="1378194" y="254482"/>
+                  </a:lnTo>
+                  <a:lnTo>
+                    <a:pt x="1389590" y="254482"/>
+                  </a:lnTo>
+                  <a:lnTo>
+                    <a:pt x="1389590" y="1969730"/>
+                  </a:lnTo>
+                  <a:lnTo>
+                    <a:pt x="1389362" y="1969730"/>
+                  </a:lnTo>
+                  <a:lnTo>
+                    <a:pt x="1328395" y="1929407"/>
+                  </a:lnTo>
+                  <a:cubicBezTo>
+                    <a:pt x="1118993" y="1803914"/>
+                    <a:pt x="802091" y="1723925"/>
+                    <a:pt x="447414" y="1723925"/>
+                  </a:cubicBezTo>
+                  <a:cubicBezTo>
+                    <a:pt x="289780" y="1723925"/>
+                    <a:pt x="139608" y="1739725"/>
+                    <a:pt x="3018" y="1768299"/>
+                  </a:cubicBezTo>
+                  <a:lnTo>
+                    <a:pt x="0" y="1769109"/>
+                  </a:lnTo>
+                  <a:lnTo>
+                    <a:pt x="0" y="254482"/>
+                  </a:lnTo>
+                  <a:lnTo>
+                    <a:pt x="2355" y="254482"/>
+                  </a:lnTo>
+                  <a:lnTo>
+                    <a:pt x="2355" y="42248"/>
+                  </a:lnTo>
+                  <a:lnTo>
+                    <a:pt x="202820" y="11472"/>
+                  </a:lnTo>
+                  <a:cubicBezTo>
+                    <a:pt x="277141" y="3950"/>
+                    <a:pt x="354092" y="0"/>
+                    <a:pt x="432909" y="0"/>
+                  </a:cubicBezTo>
+                  <a:close/>
+                </a:path>
+              </a:pathLst>
+            </a:custGeom>
+            <a:grpFill/>
+            <a:ln>
+              <a:noFill/>
+            </a:ln>
+          </p:spPr>
+          <p:style>
+            <a:lnRef idx="2">
+              <a:schemeClr val="accent1">
+                <a:shade val="50000"/>
+              </a:schemeClr>
+            </a:lnRef>
+            <a:fillRef idx="1">
+              <a:schemeClr val="accent1"/>
+            </a:fillRef>
+            <a:effectRef idx="0">
+              <a:schemeClr val="accent1"/>
+            </a:effectRef>
+            <a:fontRef idx="minor">
+              <a:schemeClr val="lt1"/>
+            </a:fontRef>
+          </p:style>
+          <p:txBody>
+            <a:bodyPr rtlCol="0" anchor="ctr"/>
+            <a:lstStyle/>
+            <a:p>
+              <a:pPr algn="ctr"/>
+              <a:endParaRPr lang="en-US"/>
+            </a:p>
+          </p:txBody>
+        </p:sp>
+        <p:sp>
+          <p:nvSpPr>
+            <p:cNvPr id="108" name="Freeform: Shape 107"/>
+            <p:cNvSpPr/>
+            <p:nvPr/>
+          </p:nvSpPr>
+          <p:spPr>
+            <a:xfrm flipH="1">
+              <a:off x="3556279" y="4524538"/>
+              <a:ext cx="945528" cy="1340277"/>
+            </a:xfrm>
+            <a:custGeom>
+              <a:avLst/>
+              <a:gdLst>
+                <a:gd name="connsiteX0" fmla="*/ 432909 w 1389590"/>
+                <a:gd name="connsiteY0" fmla="*/ 0 h 1969730"/>
+                <a:gd name="connsiteX1" fmla="*/ 1240204 w 1389590"/>
+                <a:gd name="connsiteY1" fmla="*/ 165384 h 1969730"/>
+                <a:gd name="connsiteX2" fmla="*/ 1378194 w 1389590"/>
+                <a:gd name="connsiteY2" fmla="*/ 248100 h 1969730"/>
+                <a:gd name="connsiteX3" fmla="*/ 1378194 w 1389590"/>
+                <a:gd name="connsiteY3" fmla="*/ 254482 h 1969730"/>
+                <a:gd name="connsiteX4" fmla="*/ 1389590 w 1389590"/>
+                <a:gd name="connsiteY4" fmla="*/ 254482 h 1969730"/>
+                <a:gd name="connsiteX5" fmla="*/ 1389590 w 1389590"/>
+                <a:gd name="connsiteY5" fmla="*/ 1969730 h 1969730"/>
+                <a:gd name="connsiteX6" fmla="*/ 1389362 w 1389590"/>
+                <a:gd name="connsiteY6" fmla="*/ 1969730 h 1969730"/>
+                <a:gd name="connsiteX7" fmla="*/ 1328395 w 1389590"/>
+                <a:gd name="connsiteY7" fmla="*/ 1929407 h 1969730"/>
+                <a:gd name="connsiteX8" fmla="*/ 447414 w 1389590"/>
+                <a:gd name="connsiteY8" fmla="*/ 1723925 h 1969730"/>
+                <a:gd name="connsiteX9" fmla="*/ 3018 w 1389590"/>
+                <a:gd name="connsiteY9" fmla="*/ 1768299 h 1969730"/>
+                <a:gd name="connsiteX10" fmla="*/ 0 w 1389590"/>
+                <a:gd name="connsiteY10" fmla="*/ 1769109 h 1969730"/>
+                <a:gd name="connsiteX11" fmla="*/ 0 w 1389590"/>
+                <a:gd name="connsiteY11" fmla="*/ 254482 h 1969730"/>
+                <a:gd name="connsiteX12" fmla="*/ 2355 w 1389590"/>
+                <a:gd name="connsiteY12" fmla="*/ 254482 h 1969730"/>
+                <a:gd name="connsiteX13" fmla="*/ 2355 w 1389590"/>
+                <a:gd name="connsiteY13" fmla="*/ 42248 h 1969730"/>
+                <a:gd name="connsiteX14" fmla="*/ 202820 w 1389590"/>
+                <a:gd name="connsiteY14" fmla="*/ 11472 h 1969730"/>
+                <a:gd name="connsiteX15" fmla="*/ 432909 w 1389590"/>
+                <a:gd name="connsiteY15" fmla="*/ 0 h 1969730"/>
+              </a:gdLst>
+              <a:ahLst/>
+              <a:cxnLst>
+                <a:cxn ang="0">
+                  <a:pos x="connsiteX0" y="connsiteY0"/>
+                </a:cxn>
+                <a:cxn ang="0">
+                  <a:pos x="connsiteX1" y="connsiteY1"/>
+                </a:cxn>
+                <a:cxn ang="0">
+                  <a:pos x="connsiteX2" y="connsiteY2"/>
+                </a:cxn>
+                <a:cxn ang="0">
+                  <a:pos x="connsiteX3" y="connsiteY3"/>
+                </a:cxn>
+                <a:cxn ang="0">
+                  <a:pos x="connsiteX4" y="connsiteY4"/>
+                </a:cxn>
+                <a:cxn ang="0">
+                  <a:pos x="connsiteX5" y="connsiteY5"/>
+                </a:cxn>
+                <a:cxn ang="0">
+                  <a:pos x="connsiteX6" y="connsiteY6"/>
+                </a:cxn>
+                <a:cxn ang="0">
+                  <a:pos x="connsiteX7" y="connsiteY7"/>
+                </a:cxn>
+                <a:cxn ang="0">
+                  <a:pos x="connsiteX8" y="connsiteY8"/>
+                </a:cxn>
+                <a:cxn ang="0">
+                  <a:pos x="connsiteX9" y="connsiteY9"/>
+                </a:cxn>
+                <a:cxn ang="0">
+                  <a:pos x="connsiteX10" y="connsiteY10"/>
+                </a:cxn>
+                <a:cxn ang="0">
+                  <a:pos x="connsiteX11" y="connsiteY11"/>
+                </a:cxn>
+                <a:cxn ang="0">
+                  <a:pos x="connsiteX12" y="connsiteY12"/>
+                </a:cxn>
+                <a:cxn ang="0">
+                  <a:pos x="connsiteX13" y="connsiteY13"/>
+                </a:cxn>
+                <a:cxn ang="0">
+                  <a:pos x="connsiteX14" y="connsiteY14"/>
+                </a:cxn>
+                <a:cxn ang="0">
+                  <a:pos x="connsiteX15" y="connsiteY15"/>
+                </a:cxn>
+              </a:cxnLst>
+              <a:rect l="l" t="t" r="r" b="b"/>
+              <a:pathLst>
+                <a:path w="1389590" h="1969730">
+                  <a:moveTo>
+                    <a:pt x="432909" y="0"/>
+                  </a:moveTo>
+                  <a:cubicBezTo>
+                    <a:pt x="748177" y="0"/>
+                    <a:pt x="1033599" y="63201"/>
+                    <a:pt x="1240204" y="165384"/>
+                  </a:cubicBezTo>
+                  <a:lnTo>
+                    <a:pt x="1378194" y="248100"/>
+                  </a:lnTo>
+                  <a:lnTo>
+                    <a:pt x="1378194" y="254482"/>
+                  </a:lnTo>
+                  <a:lnTo>
+                    <a:pt x="1389590" y="254482"/>
+                  </a:lnTo>
+                  <a:lnTo>
+                    <a:pt x="1389590" y="1969730"/>
+                  </a:lnTo>
+                  <a:lnTo>
+                    <a:pt x="1389362" y="1969730"/>
+                  </a:lnTo>
+                  <a:lnTo>
+                    <a:pt x="1328395" y="1929407"/>
+                  </a:lnTo>
+                  <a:cubicBezTo>
+                    <a:pt x="1118993" y="1803914"/>
+                    <a:pt x="802091" y="1723925"/>
+                    <a:pt x="447414" y="1723925"/>
+                  </a:cubicBezTo>
+                  <a:cubicBezTo>
+                    <a:pt x="289780" y="1723925"/>
+                    <a:pt x="139608" y="1739725"/>
+                    <a:pt x="3018" y="1768299"/>
+                  </a:cubicBezTo>
+                  <a:lnTo>
+                    <a:pt x="0" y="1769109"/>
+                  </a:lnTo>
+                  <a:lnTo>
+                    <a:pt x="0" y="254482"/>
+                  </a:lnTo>
+                  <a:lnTo>
+                    <a:pt x="2355" y="254482"/>
+                  </a:lnTo>
+                  <a:lnTo>
+                    <a:pt x="2355" y="42248"/>
+                  </a:lnTo>
+                  <a:lnTo>
+                    <a:pt x="202820" y="11472"/>
+                  </a:lnTo>
+                  <a:cubicBezTo>
+                    <a:pt x="277141" y="3950"/>
+                    <a:pt x="354092" y="0"/>
+                    <a:pt x="432909" y="0"/>
+                  </a:cubicBezTo>
+                  <a:close/>
+                </a:path>
+              </a:pathLst>
+            </a:custGeom>
+            <a:grpFill/>
+            <a:ln>
+              <a:noFill/>
+            </a:ln>
+          </p:spPr>
+          <p:style>
+            <a:lnRef idx="2">
+              <a:schemeClr val="accent1">
+                <a:shade val="50000"/>
+              </a:schemeClr>
+            </a:lnRef>
+            <a:fillRef idx="1">
+              <a:schemeClr val="accent1"/>
+            </a:fillRef>
+            <a:effectRef idx="0">
+              <a:schemeClr val="accent1"/>
+            </a:effectRef>
+            <a:fontRef idx="minor">
+              <a:schemeClr val="lt1"/>
+            </a:fontRef>
+          </p:style>
+          <p:txBody>
+            <a:bodyPr rtlCol="0" anchor="ctr"/>
+            <a:lstStyle/>
+            <a:p>
+              <a:pPr algn="ctr"/>
+              <a:endParaRPr lang="en-US"/>
+            </a:p>
+          </p:txBody>
+        </p:sp>
+      </p:grpSp>
+      <p:grpSp>
+        <p:nvGrpSpPr>
+          <p:cNvPr id="109" name="Group 108"/>
+          <p:cNvGrpSpPr/>
+          <p:nvPr/>
+        </p:nvGrpSpPr>
+        <p:grpSpPr>
+          <a:xfrm>
+            <a:off x="700628" y="3603091"/>
+            <a:ext cx="331066" cy="234509"/>
+            <a:chOff x="2616925" y="4524538"/>
+            <a:chExt cx="1884882" cy="1341314"/>
+          </a:xfrm>
+          <a:solidFill>
+            <a:srgbClr val="F8A15A"/>
+          </a:solidFill>
+        </p:grpSpPr>
+        <p:sp>
+          <p:nvSpPr>
+            <p:cNvPr id="110" name="Freeform: Shape 109"/>
+            <p:cNvSpPr/>
+            <p:nvPr/>
+          </p:nvSpPr>
+          <p:spPr>
+            <a:xfrm>
+              <a:off x="2616925" y="4525576"/>
+              <a:ext cx="945527" cy="1340276"/>
+            </a:xfrm>
+            <a:custGeom>
+              <a:avLst/>
+              <a:gdLst>
+                <a:gd name="connsiteX0" fmla="*/ 432909 w 1389590"/>
+                <a:gd name="connsiteY0" fmla="*/ 0 h 1969730"/>
+                <a:gd name="connsiteX1" fmla="*/ 1240204 w 1389590"/>
+                <a:gd name="connsiteY1" fmla="*/ 165384 h 1969730"/>
+                <a:gd name="connsiteX2" fmla="*/ 1378194 w 1389590"/>
+                <a:gd name="connsiteY2" fmla="*/ 248100 h 1969730"/>
+                <a:gd name="connsiteX3" fmla="*/ 1378194 w 1389590"/>
+                <a:gd name="connsiteY3" fmla="*/ 254482 h 1969730"/>
+                <a:gd name="connsiteX4" fmla="*/ 1389590 w 1389590"/>
+                <a:gd name="connsiteY4" fmla="*/ 254482 h 1969730"/>
+                <a:gd name="connsiteX5" fmla="*/ 1389590 w 1389590"/>
+                <a:gd name="connsiteY5" fmla="*/ 1969730 h 1969730"/>
+                <a:gd name="connsiteX6" fmla="*/ 1389362 w 1389590"/>
+                <a:gd name="connsiteY6" fmla="*/ 1969730 h 1969730"/>
+                <a:gd name="connsiteX7" fmla="*/ 1328395 w 1389590"/>
+                <a:gd name="connsiteY7" fmla="*/ 1929407 h 1969730"/>
+                <a:gd name="connsiteX8" fmla="*/ 447414 w 1389590"/>
+                <a:gd name="connsiteY8" fmla="*/ 1723925 h 1969730"/>
+                <a:gd name="connsiteX9" fmla="*/ 3018 w 1389590"/>
+                <a:gd name="connsiteY9" fmla="*/ 1768299 h 1969730"/>
+                <a:gd name="connsiteX10" fmla="*/ 0 w 1389590"/>
+                <a:gd name="connsiteY10" fmla="*/ 1769109 h 1969730"/>
+                <a:gd name="connsiteX11" fmla="*/ 0 w 1389590"/>
+                <a:gd name="connsiteY11" fmla="*/ 254482 h 1969730"/>
+                <a:gd name="connsiteX12" fmla="*/ 2355 w 1389590"/>
+                <a:gd name="connsiteY12" fmla="*/ 254482 h 1969730"/>
+                <a:gd name="connsiteX13" fmla="*/ 2355 w 1389590"/>
+                <a:gd name="connsiteY13" fmla="*/ 42248 h 1969730"/>
+                <a:gd name="connsiteX14" fmla="*/ 202820 w 1389590"/>
+                <a:gd name="connsiteY14" fmla="*/ 11472 h 1969730"/>
+                <a:gd name="connsiteX15" fmla="*/ 432909 w 1389590"/>
+                <a:gd name="connsiteY15" fmla="*/ 0 h 1969730"/>
+              </a:gdLst>
+              <a:ahLst/>
+              <a:cxnLst>
+                <a:cxn ang="0">
+                  <a:pos x="connsiteX0" y="connsiteY0"/>
+                </a:cxn>
+                <a:cxn ang="0">
+                  <a:pos x="connsiteX1" y="connsiteY1"/>
+                </a:cxn>
+                <a:cxn ang="0">
+                  <a:pos x="connsiteX2" y="connsiteY2"/>
+                </a:cxn>
+                <a:cxn ang="0">
+                  <a:pos x="connsiteX3" y="connsiteY3"/>
+                </a:cxn>
+                <a:cxn ang="0">
+                  <a:pos x="connsiteX4" y="connsiteY4"/>
+                </a:cxn>
+                <a:cxn ang="0">
+                  <a:pos x="connsiteX5" y="connsiteY5"/>
+                </a:cxn>
+                <a:cxn ang="0">
+                  <a:pos x="connsiteX6" y="connsiteY6"/>
+                </a:cxn>
+                <a:cxn ang="0">
+                  <a:pos x="connsiteX7" y="connsiteY7"/>
+                </a:cxn>
+                <a:cxn ang="0">
+                  <a:pos x="connsiteX8" y="connsiteY8"/>
+                </a:cxn>
+                <a:cxn ang="0">
+                  <a:pos x="connsiteX9" y="connsiteY9"/>
+                </a:cxn>
+                <a:cxn ang="0">
+                  <a:pos x="connsiteX10" y="connsiteY10"/>
+                </a:cxn>
+                <a:cxn ang="0">
+                  <a:pos x="connsiteX11" y="connsiteY11"/>
+                </a:cxn>
+                <a:cxn ang="0">
+                  <a:pos x="connsiteX12" y="connsiteY12"/>
+                </a:cxn>
+                <a:cxn ang="0">
+                  <a:pos x="connsiteX13" y="connsiteY13"/>
+                </a:cxn>
+                <a:cxn ang="0">
+                  <a:pos x="connsiteX14" y="connsiteY14"/>
+                </a:cxn>
+                <a:cxn ang="0">
+                  <a:pos x="connsiteX15" y="connsiteY15"/>
+                </a:cxn>
+              </a:cxnLst>
+              <a:rect l="l" t="t" r="r" b="b"/>
+              <a:pathLst>
+                <a:path w="1389590" h="1969730">
+                  <a:moveTo>
+                    <a:pt x="432909" y="0"/>
+                  </a:moveTo>
+                  <a:cubicBezTo>
+                    <a:pt x="748177" y="0"/>
+                    <a:pt x="1033599" y="63201"/>
+                    <a:pt x="1240204" y="165384"/>
+                  </a:cubicBezTo>
+                  <a:lnTo>
+                    <a:pt x="1378194" y="248100"/>
+                  </a:lnTo>
+                  <a:lnTo>
+                    <a:pt x="1378194" y="254482"/>
+                  </a:lnTo>
+                  <a:lnTo>
+                    <a:pt x="1389590" y="254482"/>
+                  </a:lnTo>
+                  <a:lnTo>
+                    <a:pt x="1389590" y="1969730"/>
+                  </a:lnTo>
+                  <a:lnTo>
+                    <a:pt x="1389362" y="1969730"/>
+                  </a:lnTo>
+                  <a:lnTo>
+                    <a:pt x="1328395" y="1929407"/>
+                  </a:lnTo>
+                  <a:cubicBezTo>
+                    <a:pt x="1118993" y="1803914"/>
+                    <a:pt x="802091" y="1723925"/>
+                    <a:pt x="447414" y="1723925"/>
+                  </a:cubicBezTo>
+                  <a:cubicBezTo>
+                    <a:pt x="289780" y="1723925"/>
+                    <a:pt x="139608" y="1739725"/>
+                    <a:pt x="3018" y="1768299"/>
+                  </a:cubicBezTo>
+                  <a:lnTo>
+                    <a:pt x="0" y="1769109"/>
+                  </a:lnTo>
+                  <a:lnTo>
+                    <a:pt x="0" y="254482"/>
+                  </a:lnTo>
+                  <a:lnTo>
+                    <a:pt x="2355" y="254482"/>
+                  </a:lnTo>
+                  <a:lnTo>
+                    <a:pt x="2355" y="42248"/>
+                  </a:lnTo>
+                  <a:lnTo>
+                    <a:pt x="202820" y="11472"/>
+                  </a:lnTo>
+                  <a:cubicBezTo>
+                    <a:pt x="277141" y="3950"/>
+                    <a:pt x="354092" y="0"/>
+                    <a:pt x="432909" y="0"/>
+                  </a:cubicBezTo>
+                  <a:close/>
+                </a:path>
+              </a:pathLst>
+            </a:custGeom>
+            <a:grpFill/>
+            <a:ln w="12700">
+              <a:solidFill>
+                <a:srgbClr val="0070C0"/>
+              </a:solidFill>
+            </a:ln>
+          </p:spPr>
+          <p:style>
+            <a:lnRef idx="2">
+              <a:schemeClr val="accent1">
+                <a:shade val="50000"/>
+              </a:schemeClr>
+            </a:lnRef>
+            <a:fillRef idx="1">
+              <a:schemeClr val="accent1"/>
+            </a:fillRef>
+            <a:effectRef idx="0">
+              <a:schemeClr val="accent1"/>
+            </a:effectRef>
+            <a:fontRef idx="minor">
+              <a:schemeClr val="lt1"/>
+            </a:fontRef>
+          </p:style>
+          <p:txBody>
+            <a:bodyPr rtlCol="0" anchor="ctr"/>
+            <a:lstStyle/>
+            <a:p>
+              <a:pPr algn="ctr"/>
+              <a:endParaRPr lang="en-US"/>
+            </a:p>
+          </p:txBody>
+        </p:sp>
+        <p:sp>
+          <p:nvSpPr>
+            <p:cNvPr id="111" name="Freeform: Shape 110"/>
+            <p:cNvSpPr/>
+            <p:nvPr/>
+          </p:nvSpPr>
+          <p:spPr>
+            <a:xfrm flipH="1">
+              <a:off x="3556279" y="4524538"/>
+              <a:ext cx="945528" cy="1340277"/>
+            </a:xfrm>
+            <a:custGeom>
+              <a:avLst/>
+              <a:gdLst>
+                <a:gd name="connsiteX0" fmla="*/ 432909 w 1389590"/>
+                <a:gd name="connsiteY0" fmla="*/ 0 h 1969730"/>
+                <a:gd name="connsiteX1" fmla="*/ 1240204 w 1389590"/>
+                <a:gd name="connsiteY1" fmla="*/ 165384 h 1969730"/>
+                <a:gd name="connsiteX2" fmla="*/ 1378194 w 1389590"/>
+                <a:gd name="connsiteY2" fmla="*/ 248100 h 1969730"/>
+                <a:gd name="connsiteX3" fmla="*/ 1378194 w 1389590"/>
+                <a:gd name="connsiteY3" fmla="*/ 254482 h 1969730"/>
+                <a:gd name="connsiteX4" fmla="*/ 1389590 w 1389590"/>
+                <a:gd name="connsiteY4" fmla="*/ 254482 h 1969730"/>
+                <a:gd name="connsiteX5" fmla="*/ 1389590 w 1389590"/>
+                <a:gd name="connsiteY5" fmla="*/ 1969730 h 1969730"/>
+                <a:gd name="connsiteX6" fmla="*/ 1389362 w 1389590"/>
+                <a:gd name="connsiteY6" fmla="*/ 1969730 h 1969730"/>
+                <a:gd name="connsiteX7" fmla="*/ 1328395 w 1389590"/>
+                <a:gd name="connsiteY7" fmla="*/ 1929407 h 1969730"/>
+                <a:gd name="connsiteX8" fmla="*/ 447414 w 1389590"/>
+                <a:gd name="connsiteY8" fmla="*/ 1723925 h 1969730"/>
+                <a:gd name="connsiteX9" fmla="*/ 3018 w 1389590"/>
+                <a:gd name="connsiteY9" fmla="*/ 1768299 h 1969730"/>
+                <a:gd name="connsiteX10" fmla="*/ 0 w 1389590"/>
+                <a:gd name="connsiteY10" fmla="*/ 1769109 h 1969730"/>
+                <a:gd name="connsiteX11" fmla="*/ 0 w 1389590"/>
+                <a:gd name="connsiteY11" fmla="*/ 254482 h 1969730"/>
+                <a:gd name="connsiteX12" fmla="*/ 2355 w 1389590"/>
+                <a:gd name="connsiteY12" fmla="*/ 254482 h 1969730"/>
+                <a:gd name="connsiteX13" fmla="*/ 2355 w 1389590"/>
+                <a:gd name="connsiteY13" fmla="*/ 42248 h 1969730"/>
+                <a:gd name="connsiteX14" fmla="*/ 202820 w 1389590"/>
+                <a:gd name="connsiteY14" fmla="*/ 11472 h 1969730"/>
+                <a:gd name="connsiteX15" fmla="*/ 432909 w 1389590"/>
+                <a:gd name="connsiteY15" fmla="*/ 0 h 1969730"/>
+              </a:gdLst>
+              <a:ahLst/>
+              <a:cxnLst>
+                <a:cxn ang="0">
+                  <a:pos x="connsiteX0" y="connsiteY0"/>
+                </a:cxn>
+                <a:cxn ang="0">
+                  <a:pos x="connsiteX1" y="connsiteY1"/>
+                </a:cxn>
+                <a:cxn ang="0">
+                  <a:pos x="connsiteX2" y="connsiteY2"/>
+                </a:cxn>
+                <a:cxn ang="0">
+                  <a:pos x="connsiteX3" y="connsiteY3"/>
+                </a:cxn>
+                <a:cxn ang="0">
+                  <a:pos x="connsiteX4" y="connsiteY4"/>
+                </a:cxn>
+                <a:cxn ang="0">
+                  <a:pos x="connsiteX5" y="connsiteY5"/>
+                </a:cxn>
+                <a:cxn ang="0">
+                  <a:pos x="connsiteX6" y="connsiteY6"/>
+                </a:cxn>
+                <a:cxn ang="0">
+                  <a:pos x="connsiteX7" y="connsiteY7"/>
+                </a:cxn>
+                <a:cxn ang="0">
+                  <a:pos x="connsiteX8" y="connsiteY8"/>
+                </a:cxn>
+                <a:cxn ang="0">
+                  <a:pos x="connsiteX9" y="connsiteY9"/>
+                </a:cxn>
+                <a:cxn ang="0">
+                  <a:pos x="connsiteX10" y="connsiteY10"/>
+                </a:cxn>
+                <a:cxn ang="0">
+                  <a:pos x="connsiteX11" y="connsiteY11"/>
+                </a:cxn>
+                <a:cxn ang="0">
+                  <a:pos x="connsiteX12" y="connsiteY12"/>
+                </a:cxn>
+                <a:cxn ang="0">
+                  <a:pos x="connsiteX13" y="connsiteY13"/>
+                </a:cxn>
+                <a:cxn ang="0">
+                  <a:pos x="connsiteX14" y="connsiteY14"/>
+                </a:cxn>
+                <a:cxn ang="0">
+                  <a:pos x="connsiteX15" y="connsiteY15"/>
+                </a:cxn>
+              </a:cxnLst>
+              <a:rect l="l" t="t" r="r" b="b"/>
+              <a:pathLst>
+                <a:path w="1389590" h="1969730">
+                  <a:moveTo>
+                    <a:pt x="432909" y="0"/>
+                  </a:moveTo>
+                  <a:cubicBezTo>
+                    <a:pt x="748177" y="0"/>
+                    <a:pt x="1033599" y="63201"/>
+                    <a:pt x="1240204" y="165384"/>
+                  </a:cubicBezTo>
+                  <a:lnTo>
+                    <a:pt x="1378194" y="248100"/>
+                  </a:lnTo>
+                  <a:lnTo>
+                    <a:pt x="1378194" y="254482"/>
+                  </a:lnTo>
+                  <a:lnTo>
+                    <a:pt x="1389590" y="254482"/>
+                  </a:lnTo>
+                  <a:lnTo>
+                    <a:pt x="1389590" y="1969730"/>
+                  </a:lnTo>
+                  <a:lnTo>
+                    <a:pt x="1389362" y="1969730"/>
+                  </a:lnTo>
+                  <a:lnTo>
+                    <a:pt x="1328395" y="1929407"/>
+                  </a:lnTo>
+                  <a:cubicBezTo>
+                    <a:pt x="1118993" y="1803914"/>
+                    <a:pt x="802091" y="1723925"/>
+                    <a:pt x="447414" y="1723925"/>
+                  </a:cubicBezTo>
+                  <a:cubicBezTo>
+                    <a:pt x="289780" y="1723925"/>
+                    <a:pt x="139608" y="1739725"/>
+                    <a:pt x="3018" y="1768299"/>
+                  </a:cubicBezTo>
+                  <a:lnTo>
+                    <a:pt x="0" y="1769109"/>
+                  </a:lnTo>
+                  <a:lnTo>
+                    <a:pt x="0" y="254482"/>
+                  </a:lnTo>
+                  <a:lnTo>
+                    <a:pt x="2355" y="254482"/>
+                  </a:lnTo>
+                  <a:lnTo>
+                    <a:pt x="2355" y="42248"/>
+                  </a:lnTo>
+                  <a:lnTo>
+                    <a:pt x="202820" y="11472"/>
+                  </a:lnTo>
+                  <a:cubicBezTo>
+                    <a:pt x="277141" y="3950"/>
+                    <a:pt x="354092" y="0"/>
+                    <a:pt x="432909" y="0"/>
+                  </a:cubicBezTo>
+                  <a:close/>
+                </a:path>
+              </a:pathLst>
+            </a:custGeom>
+            <a:grpFill/>
+            <a:ln w="12700">
+              <a:solidFill>
+                <a:srgbClr val="0070C0"/>
+              </a:solidFill>
+            </a:ln>
+          </p:spPr>
+          <p:style>
+            <a:lnRef idx="2">
+              <a:schemeClr val="accent1">
+                <a:shade val="50000"/>
+              </a:schemeClr>
+            </a:lnRef>
+            <a:fillRef idx="1">
+              <a:schemeClr val="accent1"/>
+            </a:fillRef>
+            <a:effectRef idx="0">
+              <a:schemeClr val="accent1"/>
+            </a:effectRef>
+            <a:fontRef idx="minor">
+              <a:schemeClr val="lt1"/>
+            </a:fontRef>
+          </p:style>
+          <p:txBody>
+            <a:bodyPr rtlCol="0" anchor="ctr"/>
+            <a:lstStyle/>
+            <a:p>
+              <a:pPr algn="ctr"/>
+              <a:endParaRPr lang="en-US"/>
+            </a:p>
+          </p:txBody>
+        </p:sp>
+      </p:grpSp>
+      <p:sp>
+        <p:nvSpPr>
+          <p:cNvPr id="120" name="Rectangle 4"/>
+          <p:cNvSpPr/>
+          <p:nvPr/>
+        </p:nvSpPr>
+        <p:spPr>
+          <a:xfrm>
+            <a:off x="6250357" y="3518847"/>
+            <a:ext cx="292580" cy="294861"/>
+          </a:xfrm>
+          <a:prstGeom prst="ellipse">
+            <a:avLst/>
+          </a:prstGeom>
+          <a:solidFill>
+            <a:srgbClr val="F8A15A"/>
+          </a:solidFill>
+          <a:ln w="57150" cmpd="sng">
+            <a:noFill/>
+            <a:miter lim="800000"/>
+          </a:ln>
+        </p:spPr>
+        <p:style>
+          <a:lnRef idx="2">
+            <a:schemeClr val="accent1">
+              <a:shade val="50000"/>
+            </a:schemeClr>
+          </a:lnRef>
+          <a:fillRef idx="1">
+            <a:schemeClr val="accent1"/>
+          </a:fillRef>
+          <a:effectRef idx="0">
+            <a:schemeClr val="accent1"/>
+          </a:effectRef>
+          <a:fontRef idx="minor">
+            <a:schemeClr val="lt1"/>
+          </a:fontRef>
+        </p:style>
+        <p:txBody>
+          <a:bodyPr rtlCol="0" anchor="ctr"/>
+          <a:lstStyle/>
+          <a:p>
+            <a:pPr algn="ctr"/>
+            <a:endParaRPr lang="en-US" dirty="0"/>
+          </a:p>
+        </p:txBody>
+      </p:sp>
+      <p:sp>
+        <p:nvSpPr>
+          <p:cNvPr id="121" name="TextBox 120"/>
+          <p:cNvSpPr txBox="1"/>
+          <p:nvPr/>
+        </p:nvSpPr>
+        <p:spPr>
+          <a:xfrm>
+            <a:off x="6271018" y="3435167"/>
+            <a:ext cx="260008" cy="461665"/>
+          </a:xfrm>
+          <a:prstGeom prst="rect">
+            <a:avLst/>
+          </a:prstGeom>
+          <a:noFill/>
+          <a:ln w="12700">
+            <a:noFill/>
+          </a:ln>
+          <a:scene3d>
+            <a:camera prst="perspectiveRelaxedModerately"/>
+            <a:lightRig rig="threePt" dir="t"/>
+          </a:scene3d>
+        </p:spPr>
+        <p:txBody>
+          <a:bodyPr wrap="none" rtlCol="0">
+            <a:spAutoFit/>
+          </a:bodyPr>
+          <a:lstStyle/>
+          <a:p>
+            <a:r>
+              <a:rPr lang="en-US" sz="2400" b="1" dirty="0">
+                <a:ln>
+                  <a:solidFill>
+                    <a:schemeClr val="bg1"/>
+                  </a:solidFill>
+                </a:ln>
+                <a:solidFill>
+                  <a:srgbClr val="0070C0"/>
+                </a:solidFill>
+              </a:rPr>
+              <a:t>i</a:t>
+            </a:r>
+          </a:p>
+        </p:txBody>
+      </p:sp>
+      <p:sp>
+        <p:nvSpPr>
+          <p:cNvPr id="123" name="Rectangle 4"/>
+          <p:cNvSpPr/>
+          <p:nvPr/>
+        </p:nvSpPr>
+        <p:spPr>
+          <a:xfrm>
+            <a:off x="6741644" y="3518847"/>
+            <a:ext cx="292580" cy="294861"/>
+          </a:xfrm>
+          <a:prstGeom prst="ellipse">
+            <a:avLst/>
+          </a:prstGeom>
+          <a:solidFill>
+            <a:srgbClr val="F8A15A"/>
+          </a:solidFill>
+          <a:ln w="12700" cmpd="sng">
+            <a:solidFill>
+              <a:srgbClr val="0070C0"/>
+            </a:solidFill>
+            <a:miter lim="800000"/>
+          </a:ln>
+        </p:spPr>
+        <p:style>
+          <a:lnRef idx="2">
+            <a:schemeClr val="accent1">
+              <a:shade val="50000"/>
+            </a:schemeClr>
+          </a:lnRef>
+          <a:fillRef idx="1">
+            <a:schemeClr val="accent1"/>
+          </a:fillRef>
+          <a:effectRef idx="0">
+            <a:schemeClr val="accent1"/>
+          </a:effectRef>
+          <a:fontRef idx="minor">
+            <a:schemeClr val="lt1"/>
+          </a:fontRef>
+        </p:style>
+        <p:txBody>
+          <a:bodyPr rtlCol="0" anchor="ctr"/>
+          <a:lstStyle/>
+          <a:p>
+            <a:pPr algn="ctr"/>
+            <a:endParaRPr lang="en-US" dirty="0"/>
+          </a:p>
+        </p:txBody>
+      </p:sp>
+      <p:sp>
+        <p:nvSpPr>
+          <p:cNvPr id="125" name="TextBox 124"/>
+          <p:cNvSpPr txBox="1"/>
+          <p:nvPr/>
+        </p:nvSpPr>
+        <p:spPr>
+          <a:xfrm>
+            <a:off x="6762305" y="3435167"/>
+            <a:ext cx="260008" cy="461665"/>
+          </a:xfrm>
+          <a:prstGeom prst="rect">
+            <a:avLst/>
+          </a:prstGeom>
+          <a:noFill/>
+          <a:ln w="12700">
+            <a:noFill/>
+          </a:ln>
+          <a:scene3d>
+            <a:camera prst="perspectiveRelaxedModerately"/>
+            <a:lightRig rig="threePt" dir="t"/>
+          </a:scene3d>
+        </p:spPr>
+        <p:txBody>
+          <a:bodyPr wrap="none" rtlCol="0">
+            <a:spAutoFit/>
+          </a:bodyPr>
+          <a:lstStyle/>
+          <a:p>
+            <a:r>
+              <a:rPr lang="en-US" sz="2400" b="1" dirty="0">
+                <a:ln>
+                  <a:solidFill>
+                    <a:schemeClr val="bg1"/>
+                  </a:solidFill>
+                </a:ln>
+                <a:solidFill>
+                  <a:srgbClr val="0070C0"/>
+                </a:solidFill>
+              </a:rPr>
+              <a:t>i</a:t>
+            </a:r>
+          </a:p>
+        </p:txBody>
+      </p:sp>
+      <p:grpSp>
+        <p:nvGrpSpPr>
+          <p:cNvPr id="126" name="Group 125"/>
+          <p:cNvGrpSpPr/>
+          <p:nvPr/>
+        </p:nvGrpSpPr>
+        <p:grpSpPr>
+          <a:xfrm>
+            <a:off x="3132072" y="3546554"/>
+            <a:ext cx="222449" cy="260924"/>
+            <a:chOff x="6050774" y="2324289"/>
+            <a:chExt cx="922593" cy="1082165"/>
+          </a:xfrm>
+          <a:solidFill>
+            <a:srgbClr val="F79646"/>
+          </a:solidFill>
+        </p:grpSpPr>
+        <p:sp>
+          <p:nvSpPr>
+            <p:cNvPr id="133" name="Rectangle: Folded Corner 132"/>
+            <p:cNvSpPr/>
+            <p:nvPr/>
+          </p:nvSpPr>
+          <p:spPr>
+            <a:xfrm>
+              <a:off x="6283929" y="2493533"/>
+              <a:ext cx="689438" cy="912921"/>
+            </a:xfrm>
+            <a:prstGeom prst="foldedCorner">
+              <a:avLst>
+                <a:gd name="adj" fmla="val 34973"/>
+              </a:avLst>
+            </a:prstGeom>
+            <a:grpFill/>
+            <a:ln w="12700">
+              <a:noFill/>
+            </a:ln>
+          </p:spPr>
+          <p:style>
+            <a:lnRef idx="2">
+              <a:schemeClr val="accent1">
+                <a:shade val="50000"/>
+              </a:schemeClr>
+            </a:lnRef>
+            <a:fillRef idx="1">
+              <a:schemeClr val="accent1"/>
+            </a:fillRef>
+            <a:effectRef idx="0">
+              <a:schemeClr val="accent1"/>
+            </a:effectRef>
+            <a:fontRef idx="minor">
+              <a:schemeClr val="lt1"/>
+            </a:fontRef>
+          </p:style>
+          <p:txBody>
+            <a:bodyPr rtlCol="0" anchor="ctr"/>
+            <a:lstStyle/>
+            <a:p>
+              <a:pPr algn="ctr"/>
+              <a:endParaRPr lang="en-US"/>
+            </a:p>
+          </p:txBody>
+        </p:sp>
+        <p:sp>
+          <p:nvSpPr>
+            <p:cNvPr id="134" name="Rectangle: Folded Corner 133"/>
+            <p:cNvSpPr/>
+            <p:nvPr/>
+          </p:nvSpPr>
+          <p:spPr>
+            <a:xfrm>
+              <a:off x="6050774" y="2324289"/>
+              <a:ext cx="689438" cy="953266"/>
+            </a:xfrm>
+            <a:prstGeom prst="foldedCorner">
+              <a:avLst>
+                <a:gd name="adj" fmla="val 50000"/>
+              </a:avLst>
+            </a:prstGeom>
+            <a:solidFill>
+              <a:srgbClr val="0070C0"/>
+            </a:solidFill>
+            <a:ln w="12700">
+              <a:noFill/>
+            </a:ln>
+          </p:spPr>
+          <p:style>
+            <a:lnRef idx="2">
+              <a:schemeClr val="accent1">
+                <a:shade val="50000"/>
+              </a:schemeClr>
+            </a:lnRef>
+            <a:fillRef idx="1">
+              <a:schemeClr val="accent1"/>
+            </a:fillRef>
+            <a:effectRef idx="0">
+              <a:schemeClr val="accent1"/>
+            </a:effectRef>
+            <a:fontRef idx="minor">
+              <a:schemeClr val="lt1"/>
+            </a:fontRef>
+          </p:style>
+          <p:txBody>
+            <a:bodyPr rtlCol="0" anchor="ctr"/>
+            <a:lstStyle/>
+            <a:p>
+              <a:pPr algn="ctr"/>
+              <a:endParaRPr lang="en-US"/>
+            </a:p>
+          </p:txBody>
+        </p:sp>
+      </p:grpSp>
+      <p:sp>
+        <p:nvSpPr>
+          <p:cNvPr id="135" name="Rectangle 4"/>
+          <p:cNvSpPr/>
+          <p:nvPr/>
+        </p:nvSpPr>
+        <p:spPr>
+          <a:xfrm>
+            <a:off x="7199677" y="3490034"/>
+            <a:ext cx="292580" cy="294861"/>
+          </a:xfrm>
+          <a:prstGeom prst="ellipse">
+            <a:avLst/>
+          </a:prstGeom>
+          <a:solidFill>
+            <a:srgbClr val="F8A15A"/>
+          </a:solidFill>
+          <a:ln w="12700" cmpd="sng">
+            <a:solidFill>
+              <a:srgbClr val="0070C0"/>
+            </a:solidFill>
+            <a:miter lim="800000"/>
+          </a:ln>
+        </p:spPr>
+        <p:style>
+          <a:lnRef idx="2">
+            <a:schemeClr val="accent1">
+              <a:shade val="50000"/>
+            </a:schemeClr>
+          </a:lnRef>
+          <a:fillRef idx="1">
+            <a:schemeClr val="accent1"/>
+          </a:fillRef>
+          <a:effectRef idx="0">
+            <a:schemeClr val="accent1"/>
+          </a:effectRef>
+          <a:fontRef idx="minor">
+            <a:schemeClr val="lt1"/>
+          </a:fontRef>
+        </p:style>
+        <p:txBody>
+          <a:bodyPr rtlCol="0" anchor="ctr"/>
+          <a:lstStyle/>
+          <a:p>
+            <a:pPr algn="ctr"/>
+            <a:endParaRPr lang="en-US" dirty="0"/>
+          </a:p>
+        </p:txBody>
+      </p:sp>
+      <p:sp>
+        <p:nvSpPr>
+          <p:cNvPr id="136" name="TextBox 135"/>
+          <p:cNvSpPr txBox="1"/>
+          <p:nvPr/>
+        </p:nvSpPr>
+        <p:spPr>
+          <a:xfrm>
+            <a:off x="7227017" y="3437348"/>
+            <a:ext cx="247184" cy="400110"/>
+          </a:xfrm>
+          <a:prstGeom prst="rect">
+            <a:avLst/>
+          </a:prstGeom>
+          <a:noFill/>
+          <a:ln w="12700">
+            <a:noFill/>
+          </a:ln>
+        </p:spPr>
+        <p:txBody>
+          <a:bodyPr wrap="none" rtlCol="0">
+            <a:spAutoFit/>
+          </a:bodyPr>
+          <a:lstStyle/>
+          <a:p>
+            <a:r>
+              <a:rPr lang="en-US" sz="2000" b="1" dirty="0">
+                <a:solidFill>
+                  <a:srgbClr val="0070C0"/>
+                </a:solidFill>
+              </a:rPr>
+              <a:t>i</a:t>
+            </a:r>
+          </a:p>
+        </p:txBody>
+      </p:sp>
     </p:spTree>
     <p:extLst>
       <p:ext uri="{BB962C8B-B14F-4D97-AF65-F5344CB8AC3E}">

</xml_diff>